<commit_message>
poster: add a few more sections for initial creation
</commit_message>
<xml_diff>
--- a/docs/poster/expo_poster-eecs-simple.pptx
+++ b/docs/poster/expo_poster-eecs-simple.pptx
@@ -184,7 +184,7 @@
           <a:bodyPr lIns="0" rIns="0" tIns="0" bIns="0" anchor="b"/>
           <a:p>
             <a:pPr algn="r"/>
-            <a:fld id="{3D9B7CE9-C352-4087-99C0-870F1E109B20}" type="slidenum">
+            <a:fld id="{566E8993-B825-43B2-8CD0-9AE6EC9F2008}" type="slidenum">
               <a:rPr lang="en-US" sz="1400">
                 <a:latin typeface="Times New Roman"/>
               </a:rPr>
@@ -266,7 +266,7 @@
                 <a:spcPct val="100000"/>
               </a:lnSpc>
             </a:pPr>
-            <a:fld id="{A8F18B7C-309A-4871-8299-513520B67464}" type="slidenum">
+            <a:fld id="{5061B757-BD00-4E05-8A83-581C71EF73ED}" type="slidenum">
               <a:rPr lang="en-US" sz="1200">
                 <a:solidFill>
                   <a:srgbClr val="000000"/>
@@ -2203,45 +2203,7 @@
                 </a:solidFill>
                 <a:latin typeface="Trebuchet MS"/>
               </a:rPr>
-              <a:t>Body. Lorem ipsum dolor sit amet, consectetur adipiscing elit. Etiam tristique consequat laoreet. Nunc fermentum pulvinar ornare.</a:t>
-            </a:r>
-            <a:endParaRPr/>
-          </a:p>
-          <a:p>
-            <a:pPr>
-              <a:lnSpc>
-                <a:spcPct val="100000"/>
-              </a:lnSpc>
-              <a:buFont typeface="Arial"/>
-              <a:buChar char="•"/>
-            </a:pPr>
-            <a:r>
-              <a:rPr lang="en-US" sz="4000">
-                <a:solidFill>
-                  <a:srgbClr val="000000"/>
-                </a:solidFill>
-                <a:latin typeface="Trebuchet MS"/>
-              </a:rPr>
-              <a:t>Fusce ac nunc in leo blandit sagittis fermentum eu sem. </a:t>
-            </a:r>
-            <a:endParaRPr/>
-          </a:p>
-          <a:p>
-            <a:pPr>
-              <a:lnSpc>
-                <a:spcPct val="100000"/>
-              </a:lnSpc>
-              <a:buFont typeface="Arial"/>
-              <a:buChar char="•"/>
-            </a:pPr>
-            <a:r>
-              <a:rPr lang="en-US" sz="4000">
-                <a:solidFill>
-                  <a:srgbClr val="000000"/>
-                </a:solidFill>
-                <a:latin typeface="Trebuchet MS"/>
-              </a:rPr>
-              <a:t>Curabitur ligula odio, facilisis in tincidunt vel, scelerisque quis nulla. </a:t>
+              <a:t>Our primary goal for the project was ease of use, so we knew having a full-color touch interface for controlling the lights was imperative.  Additionally, to negate the need to run wires to the central control interface to every light in the house, we knew our light plugs had to communicate wirelessly.</a:t>
             </a:r>
             <a:endParaRPr/>
           </a:p>
@@ -3104,36 +3066,7 @@
                 </a:solidFill>
                 <a:latin typeface="Trebuchet MS"/>
               </a:rPr>
-              <a:t>Our project was a rousing success.</a:t>
-            </a:r>
-            <a:endParaRPr/>
-          </a:p>
-          <a:p>
-            <a:pPr>
-              <a:lnSpc>
-                <a:spcPct val="100000"/>
-              </a:lnSpc>
-              <a:buFont typeface="Arial"/>
-              <a:buChar char="•"/>
-            </a:pPr>
-            <a:endParaRPr/>
-          </a:p>
-          <a:p>
-            <a:pPr>
-              <a:lnSpc>
-                <a:spcPct val="100000"/>
-              </a:lnSpc>
-              <a:buFont typeface="Arial"/>
-              <a:buChar char="•"/>
-            </a:pPr>
-            <a:r>
-              <a:rPr lang="en-US" sz="4000">
-                <a:solidFill>
-                  <a:srgbClr val="000000"/>
-                </a:solidFill>
-                <a:latin typeface="Trebuchet MS"/>
-              </a:rPr>
-              <a:t>We recommend you use it.</a:t>
+              <a:t>&lt;include plan for how to test if it was successful&gt;</a:t>
             </a:r>
             <a:endParaRPr/>
           </a:p>

</xml_diff>

<commit_message>
poster: added some text to the results and recommendations section
</commit_message>
<xml_diff>
--- a/docs/poster/expo_poster-eecs-simple.pptx
+++ b/docs/poster/expo_poster-eecs-simple.pptx
@@ -1,22 +1,409 @@
 
 <file path=ppt/presentation.xml><?xml version="1.0" encoding="utf-8"?>
-<p:presentation xmlns:a="http://schemas.openxmlformats.org/drawingml/2006/main" xmlns:p="http://schemas.openxmlformats.org/presentationml/2006/main" xmlns:r="http://schemas.openxmlformats.org/officeDocument/2006/relationships">
+<p:presentation xmlns:a="http://schemas.openxmlformats.org/drawingml/2006/main" xmlns:r="http://schemas.openxmlformats.org/officeDocument/2006/relationships" xmlns:p="http://schemas.openxmlformats.org/presentationml/2006/main">
   <p:sldMasterIdLst>
-    <p:sldMasterId id="2147483648" r:id="rId2"/>
+    <p:sldMasterId id="2147483648" r:id="rId1"/>
   </p:sldMasterIdLst>
   <p:notesMasterIdLst>
     <p:notesMasterId r:id="rId3"/>
   </p:notesMasterIdLst>
   <p:sldIdLst>
-    <p:sldId id="256" r:id="rId4"/>
+    <p:sldId id="256" r:id="rId2"/>
   </p:sldIdLst>
   <p:sldSz cx="43891200" cy="32918400"/>
   <p:notesSz cx="6858000" cy="9144000"/>
+  <p:defaultTextStyle>
+    <a:defPPr>
+      <a:defRPr lang="en-US"/>
+    </a:defPPr>
+    <a:lvl1pPr marL="0" algn="l" defTabSz="914400" rtl="0" eaLnBrk="1" latinLnBrk="0" hangingPunct="1">
+      <a:defRPr sz="1800" kern="1200">
+        <a:solidFill>
+          <a:schemeClr val="tx1"/>
+        </a:solidFill>
+        <a:latin typeface="+mn-lt"/>
+        <a:ea typeface="+mn-ea"/>
+        <a:cs typeface="+mn-cs"/>
+      </a:defRPr>
+    </a:lvl1pPr>
+    <a:lvl2pPr marL="457200" algn="l" defTabSz="914400" rtl="0" eaLnBrk="1" latinLnBrk="0" hangingPunct="1">
+      <a:defRPr sz="1800" kern="1200">
+        <a:solidFill>
+          <a:schemeClr val="tx1"/>
+        </a:solidFill>
+        <a:latin typeface="+mn-lt"/>
+        <a:ea typeface="+mn-ea"/>
+        <a:cs typeface="+mn-cs"/>
+      </a:defRPr>
+    </a:lvl2pPr>
+    <a:lvl3pPr marL="914400" algn="l" defTabSz="914400" rtl="0" eaLnBrk="1" latinLnBrk="0" hangingPunct="1">
+      <a:defRPr sz="1800" kern="1200">
+        <a:solidFill>
+          <a:schemeClr val="tx1"/>
+        </a:solidFill>
+        <a:latin typeface="+mn-lt"/>
+        <a:ea typeface="+mn-ea"/>
+        <a:cs typeface="+mn-cs"/>
+      </a:defRPr>
+    </a:lvl3pPr>
+    <a:lvl4pPr marL="1371600" algn="l" defTabSz="914400" rtl="0" eaLnBrk="1" latinLnBrk="0" hangingPunct="1">
+      <a:defRPr sz="1800" kern="1200">
+        <a:solidFill>
+          <a:schemeClr val="tx1"/>
+        </a:solidFill>
+        <a:latin typeface="+mn-lt"/>
+        <a:ea typeface="+mn-ea"/>
+        <a:cs typeface="+mn-cs"/>
+      </a:defRPr>
+    </a:lvl4pPr>
+    <a:lvl5pPr marL="1828800" algn="l" defTabSz="914400" rtl="0" eaLnBrk="1" latinLnBrk="0" hangingPunct="1">
+      <a:defRPr sz="1800" kern="1200">
+        <a:solidFill>
+          <a:schemeClr val="tx1"/>
+        </a:solidFill>
+        <a:latin typeface="+mn-lt"/>
+        <a:ea typeface="+mn-ea"/>
+        <a:cs typeface="+mn-cs"/>
+      </a:defRPr>
+    </a:lvl5pPr>
+    <a:lvl6pPr marL="2286000" algn="l" defTabSz="914400" rtl="0" eaLnBrk="1" latinLnBrk="0" hangingPunct="1">
+      <a:defRPr sz="1800" kern="1200">
+        <a:solidFill>
+          <a:schemeClr val="tx1"/>
+        </a:solidFill>
+        <a:latin typeface="+mn-lt"/>
+        <a:ea typeface="+mn-ea"/>
+        <a:cs typeface="+mn-cs"/>
+      </a:defRPr>
+    </a:lvl6pPr>
+    <a:lvl7pPr marL="2743200" algn="l" defTabSz="914400" rtl="0" eaLnBrk="1" latinLnBrk="0" hangingPunct="1">
+      <a:defRPr sz="1800" kern="1200">
+        <a:solidFill>
+          <a:schemeClr val="tx1"/>
+        </a:solidFill>
+        <a:latin typeface="+mn-lt"/>
+        <a:ea typeface="+mn-ea"/>
+        <a:cs typeface="+mn-cs"/>
+      </a:defRPr>
+    </a:lvl7pPr>
+    <a:lvl8pPr marL="3200400" algn="l" defTabSz="914400" rtl="0" eaLnBrk="1" latinLnBrk="0" hangingPunct="1">
+      <a:defRPr sz="1800" kern="1200">
+        <a:solidFill>
+          <a:schemeClr val="tx1"/>
+        </a:solidFill>
+        <a:latin typeface="+mn-lt"/>
+        <a:ea typeface="+mn-ea"/>
+        <a:cs typeface="+mn-cs"/>
+      </a:defRPr>
+    </a:lvl8pPr>
+    <a:lvl9pPr marL="3657600" algn="l" defTabSz="914400" rtl="0" eaLnBrk="1" latinLnBrk="0" hangingPunct="1">
+      <a:defRPr sz="1800" kern="1200">
+        <a:solidFill>
+          <a:schemeClr val="tx1"/>
+        </a:solidFill>
+        <a:latin typeface="+mn-lt"/>
+        <a:ea typeface="+mn-ea"/>
+        <a:cs typeface="+mn-cs"/>
+      </a:defRPr>
+    </a:lvl9pPr>
+  </p:defaultTextStyle>
 </p:presentation>
 </file>
 
 <file path=ppt/notesMasters/notesMaster1.xml><?xml version="1.0" encoding="utf-8"?>
-<p:notesMaster xmlns:a="http://schemas.openxmlformats.org/drawingml/2006/main" xmlns:p="http://schemas.openxmlformats.org/presentationml/2006/main" xmlns:r="http://schemas.openxmlformats.org/officeDocument/2006/relationships">
+<p:notesMaster xmlns:a="http://schemas.openxmlformats.org/drawingml/2006/main" xmlns:r="http://schemas.openxmlformats.org/officeDocument/2006/relationships" xmlns:p="http://schemas.openxmlformats.org/presentationml/2006/main">
+  <p:cSld>
+    <p:bg>
+      <p:bgRef idx="1001">
+        <a:schemeClr val="bg1"/>
+      </p:bgRef>
+    </p:bg>
+    <p:spTree>
+      <p:nvGrpSpPr>
+        <p:cNvPr id="1" name=""/>
+        <p:cNvGrpSpPr/>
+        <p:nvPr/>
+      </p:nvGrpSpPr>
+      <p:grpSpPr>
+        <a:xfrm>
+          <a:off x="0" y="0"/>
+          <a:ext cx="0" cy="0"/>
+          <a:chOff x="0" y="0"/>
+          <a:chExt cx="0" cy="0"/>
+        </a:xfrm>
+      </p:grpSpPr>
+      <p:sp>
+        <p:nvSpPr>
+          <p:cNvPr id="50" name="PlaceHolder 1"/>
+          <p:cNvSpPr>
+            <a:spLocks noGrp="1"/>
+          </p:cNvSpPr>
+          <p:nvPr>
+            <p:ph type="body"/>
+          </p:nvPr>
+        </p:nvSpPr>
+        <p:spPr>
+          <a:xfrm>
+            <a:off x="777240" y="4777560"/>
+            <a:ext cx="6217560" cy="4525920"/>
+          </a:xfrm>
+          <a:prstGeom prst="rect">
+            <a:avLst/>
+          </a:prstGeom>
+        </p:spPr>
+        <p:txBody>
+          <a:bodyPr lIns="0" tIns="0" rIns="0" bIns="0"/>
+          <a:lstStyle/>
+          <a:p>
+            <a:r>
+              <a:rPr lang="en-US" sz="2000">
+                <a:latin typeface="Arial"/>
+              </a:rPr>
+              <a:t>Click to edit the notes format</a:t>
+            </a:r>
+            <a:endParaRPr/>
+          </a:p>
+        </p:txBody>
+      </p:sp>
+      <p:sp>
+        <p:nvSpPr>
+          <p:cNvPr id="51" name="PlaceHolder 2"/>
+          <p:cNvSpPr>
+            <a:spLocks noGrp="1"/>
+          </p:cNvSpPr>
+          <p:nvPr>
+            <p:ph type="hdr"/>
+          </p:nvPr>
+        </p:nvSpPr>
+        <p:spPr>
+          <a:xfrm>
+            <a:off x="0" y="0"/>
+            <a:ext cx="3372840" cy="502560"/>
+          </a:xfrm>
+          <a:prstGeom prst="rect">
+            <a:avLst/>
+          </a:prstGeom>
+        </p:spPr>
+        <p:txBody>
+          <a:bodyPr lIns="0" tIns="0" rIns="0" bIns="0"/>
+          <a:lstStyle/>
+          <a:p>
+            <a:r>
+              <a:rPr lang="en-US" sz="1400">
+                <a:latin typeface="Times New Roman"/>
+              </a:rPr>
+              <a:t>&lt;header&gt;</a:t>
+            </a:r>
+            <a:endParaRPr/>
+          </a:p>
+        </p:txBody>
+      </p:sp>
+      <p:sp>
+        <p:nvSpPr>
+          <p:cNvPr id="52" name="PlaceHolder 3"/>
+          <p:cNvSpPr>
+            <a:spLocks noGrp="1"/>
+          </p:cNvSpPr>
+          <p:nvPr>
+            <p:ph type="dt"/>
+          </p:nvPr>
+        </p:nvSpPr>
+        <p:spPr>
+          <a:xfrm>
+            <a:off x="4399200" y="0"/>
+            <a:ext cx="3372840" cy="502560"/>
+          </a:xfrm>
+          <a:prstGeom prst="rect">
+            <a:avLst/>
+          </a:prstGeom>
+        </p:spPr>
+        <p:txBody>
+          <a:bodyPr lIns="0" tIns="0" rIns="0" bIns="0"/>
+          <a:lstStyle/>
+          <a:p>
+            <a:pPr algn="r"/>
+            <a:r>
+              <a:rPr lang="en-US" sz="1400">
+                <a:latin typeface="Times New Roman"/>
+              </a:rPr>
+              <a:t>&lt;date/time&gt;</a:t>
+            </a:r>
+            <a:endParaRPr/>
+          </a:p>
+        </p:txBody>
+      </p:sp>
+      <p:sp>
+        <p:nvSpPr>
+          <p:cNvPr id="53" name="PlaceHolder 4"/>
+          <p:cNvSpPr>
+            <a:spLocks noGrp="1"/>
+          </p:cNvSpPr>
+          <p:nvPr>
+            <p:ph type="ftr"/>
+          </p:nvPr>
+        </p:nvSpPr>
+        <p:spPr>
+          <a:xfrm>
+            <a:off x="0" y="9555480"/>
+            <a:ext cx="3372840" cy="502560"/>
+          </a:xfrm>
+          <a:prstGeom prst="rect">
+            <a:avLst/>
+          </a:prstGeom>
+        </p:spPr>
+        <p:txBody>
+          <a:bodyPr lIns="0" tIns="0" rIns="0" bIns="0" anchor="b"/>
+          <a:lstStyle/>
+          <a:p>
+            <a:r>
+              <a:rPr lang="en-US" sz="1400">
+                <a:latin typeface="Times New Roman"/>
+              </a:rPr>
+              <a:t>&lt;footer&gt;</a:t>
+            </a:r>
+            <a:endParaRPr/>
+          </a:p>
+        </p:txBody>
+      </p:sp>
+      <p:sp>
+        <p:nvSpPr>
+          <p:cNvPr id="54" name="PlaceHolder 5"/>
+          <p:cNvSpPr>
+            <a:spLocks noGrp="1"/>
+          </p:cNvSpPr>
+          <p:nvPr>
+            <p:ph type="sldNum"/>
+          </p:nvPr>
+        </p:nvSpPr>
+        <p:spPr>
+          <a:xfrm>
+            <a:off x="4399200" y="9555480"/>
+            <a:ext cx="3372840" cy="502560"/>
+          </a:xfrm>
+          <a:prstGeom prst="rect">
+            <a:avLst/>
+          </a:prstGeom>
+        </p:spPr>
+        <p:txBody>
+          <a:bodyPr lIns="0" tIns="0" rIns="0" bIns="0" anchor="b"/>
+          <a:lstStyle/>
+          <a:p>
+            <a:pPr algn="r"/>
+            <a:fld id="{566E8993-B825-43B2-8CD0-9AE6EC9F2008}" type="slidenum">
+              <a:rPr lang="en-US" sz="1400">
+                <a:latin typeface="Times New Roman"/>
+              </a:rPr>
+              <a:t>‹#›</a:t>
+            </a:fld>
+            <a:endParaRPr/>
+          </a:p>
+        </p:txBody>
+      </p:sp>
+    </p:spTree>
+    <p:extLst>
+      <p:ext uri="{BB962C8B-B14F-4D97-AF65-F5344CB8AC3E}">
+        <p14:creationId xmlns:p14="http://schemas.microsoft.com/office/powerpoint/2010/main" val="2170166304"/>
+      </p:ext>
+    </p:extLst>
+  </p:cSld>
+  <p:clrMap bg1="lt1" tx1="dk1" bg2="lt2" tx2="dk2" accent1="accent1" accent2="accent2" accent3="accent3" accent4="accent4" accent5="accent5" accent6="accent6" hlink="hlink" folHlink="folHlink"/>
+  <p:notesStyle>
+    <a:lvl1pPr marL="0" algn="l" defTabSz="914400" rtl="0" eaLnBrk="1" latinLnBrk="0" hangingPunct="1">
+      <a:defRPr sz="1200" kern="1200">
+        <a:solidFill>
+          <a:schemeClr val="tx1"/>
+        </a:solidFill>
+        <a:latin typeface="+mn-lt"/>
+        <a:ea typeface="+mn-ea"/>
+        <a:cs typeface="+mn-cs"/>
+      </a:defRPr>
+    </a:lvl1pPr>
+    <a:lvl2pPr marL="457200" algn="l" defTabSz="914400" rtl="0" eaLnBrk="1" latinLnBrk="0" hangingPunct="1">
+      <a:defRPr sz="1200" kern="1200">
+        <a:solidFill>
+          <a:schemeClr val="tx1"/>
+        </a:solidFill>
+        <a:latin typeface="+mn-lt"/>
+        <a:ea typeface="+mn-ea"/>
+        <a:cs typeface="+mn-cs"/>
+      </a:defRPr>
+    </a:lvl2pPr>
+    <a:lvl3pPr marL="914400" algn="l" defTabSz="914400" rtl="0" eaLnBrk="1" latinLnBrk="0" hangingPunct="1">
+      <a:defRPr sz="1200" kern="1200">
+        <a:solidFill>
+          <a:schemeClr val="tx1"/>
+        </a:solidFill>
+        <a:latin typeface="+mn-lt"/>
+        <a:ea typeface="+mn-ea"/>
+        <a:cs typeface="+mn-cs"/>
+      </a:defRPr>
+    </a:lvl3pPr>
+    <a:lvl4pPr marL="1371600" algn="l" defTabSz="914400" rtl="0" eaLnBrk="1" latinLnBrk="0" hangingPunct="1">
+      <a:defRPr sz="1200" kern="1200">
+        <a:solidFill>
+          <a:schemeClr val="tx1"/>
+        </a:solidFill>
+        <a:latin typeface="+mn-lt"/>
+        <a:ea typeface="+mn-ea"/>
+        <a:cs typeface="+mn-cs"/>
+      </a:defRPr>
+    </a:lvl4pPr>
+    <a:lvl5pPr marL="1828800" algn="l" defTabSz="914400" rtl="0" eaLnBrk="1" latinLnBrk="0" hangingPunct="1">
+      <a:defRPr sz="1200" kern="1200">
+        <a:solidFill>
+          <a:schemeClr val="tx1"/>
+        </a:solidFill>
+        <a:latin typeface="+mn-lt"/>
+        <a:ea typeface="+mn-ea"/>
+        <a:cs typeface="+mn-cs"/>
+      </a:defRPr>
+    </a:lvl5pPr>
+    <a:lvl6pPr marL="2286000" algn="l" defTabSz="914400" rtl="0" eaLnBrk="1" latinLnBrk="0" hangingPunct="1">
+      <a:defRPr sz="1200" kern="1200">
+        <a:solidFill>
+          <a:schemeClr val="tx1"/>
+        </a:solidFill>
+        <a:latin typeface="+mn-lt"/>
+        <a:ea typeface="+mn-ea"/>
+        <a:cs typeface="+mn-cs"/>
+      </a:defRPr>
+    </a:lvl6pPr>
+    <a:lvl7pPr marL="2743200" algn="l" defTabSz="914400" rtl="0" eaLnBrk="1" latinLnBrk="0" hangingPunct="1">
+      <a:defRPr sz="1200" kern="1200">
+        <a:solidFill>
+          <a:schemeClr val="tx1"/>
+        </a:solidFill>
+        <a:latin typeface="+mn-lt"/>
+        <a:ea typeface="+mn-ea"/>
+        <a:cs typeface="+mn-cs"/>
+      </a:defRPr>
+    </a:lvl7pPr>
+    <a:lvl8pPr marL="3200400" algn="l" defTabSz="914400" rtl="0" eaLnBrk="1" latinLnBrk="0" hangingPunct="1">
+      <a:defRPr sz="1200" kern="1200">
+        <a:solidFill>
+          <a:schemeClr val="tx1"/>
+        </a:solidFill>
+        <a:latin typeface="+mn-lt"/>
+        <a:ea typeface="+mn-ea"/>
+        <a:cs typeface="+mn-cs"/>
+      </a:defRPr>
+    </a:lvl8pPr>
+    <a:lvl9pPr marL="3657600" algn="l" defTabSz="914400" rtl="0" eaLnBrk="1" latinLnBrk="0" hangingPunct="1">
+      <a:defRPr sz="1200" kern="1200">
+        <a:solidFill>
+          <a:schemeClr val="tx1"/>
+        </a:solidFill>
+        <a:latin typeface="+mn-lt"/>
+        <a:ea typeface="+mn-ea"/>
+        <a:cs typeface="+mn-cs"/>
+      </a:defRPr>
+    </a:lvl9pPr>
+  </p:notesStyle>
+</p:notesMaster>
+</file>
+
+<file path=ppt/notesSlides/notesSlide1.xml><?xml version="1.0" encoding="utf-8"?>
+<p:notes xmlns:a="http://schemas.openxmlformats.org/drawingml/2006/main" xmlns:r="http://schemas.openxmlformats.org/officeDocument/2006/relationships" xmlns:p="http://schemas.openxmlformats.org/presentationml/2006/main">
   <p:cSld>
     <p:spTree>
       <p:nvGrpSpPr>
@@ -34,191 +421,6 @@
       </p:grpSpPr>
       <p:sp>
         <p:nvSpPr>
-          <p:cNvPr id="50" name="PlaceHolder 1"/>
-          <p:cNvSpPr>
-            <a:spLocks noGrp="1"/>
-          </p:cNvSpPr>
-          <p:nvPr>
-            <p:ph type="body"/>
-          </p:nvPr>
-        </p:nvSpPr>
-        <p:spPr>
-          <a:xfrm>
-            <a:off x="777240" y="4777560"/>
-            <a:ext cx="6217560" cy="4525920"/>
-          </a:xfrm>
-          <a:prstGeom prst="rect">
-            <a:avLst/>
-          </a:prstGeom>
-        </p:spPr>
-        <p:txBody>
-          <a:bodyPr lIns="0" rIns="0" tIns="0" bIns="0"/>
-          <a:p>
-            <a:r>
-              <a:rPr lang="en-US" sz="2000">
-                <a:latin typeface="Arial"/>
-              </a:rPr>
-              <a:t>Click to edit the notes format</a:t>
-            </a:r>
-            <a:endParaRPr/>
-          </a:p>
-        </p:txBody>
-      </p:sp>
-      <p:sp>
-        <p:nvSpPr>
-          <p:cNvPr id="51" name="PlaceHolder 2"/>
-          <p:cNvSpPr>
-            <a:spLocks noGrp="1"/>
-          </p:cNvSpPr>
-          <p:nvPr>
-            <p:ph type="hdr"/>
-          </p:nvPr>
-        </p:nvSpPr>
-        <p:spPr>
-          <a:xfrm>
-            <a:off x="0" y="0"/>
-            <a:ext cx="3372840" cy="502560"/>
-          </a:xfrm>
-          <a:prstGeom prst="rect">
-            <a:avLst/>
-          </a:prstGeom>
-        </p:spPr>
-        <p:txBody>
-          <a:bodyPr lIns="0" rIns="0" tIns="0" bIns="0"/>
-          <a:p>
-            <a:r>
-              <a:rPr lang="en-US" sz="1400">
-                <a:latin typeface="Times New Roman"/>
-              </a:rPr>
-              <a:t>&lt;header&gt;</a:t>
-            </a:r>
-            <a:endParaRPr/>
-          </a:p>
-        </p:txBody>
-      </p:sp>
-      <p:sp>
-        <p:nvSpPr>
-          <p:cNvPr id="52" name="PlaceHolder 3"/>
-          <p:cNvSpPr>
-            <a:spLocks noGrp="1"/>
-          </p:cNvSpPr>
-          <p:nvPr>
-            <p:ph type="dt"/>
-          </p:nvPr>
-        </p:nvSpPr>
-        <p:spPr>
-          <a:xfrm>
-            <a:off x="4399200" y="0"/>
-            <a:ext cx="3372840" cy="502560"/>
-          </a:xfrm>
-          <a:prstGeom prst="rect">
-            <a:avLst/>
-          </a:prstGeom>
-        </p:spPr>
-        <p:txBody>
-          <a:bodyPr lIns="0" rIns="0" tIns="0" bIns="0"/>
-          <a:p>
-            <a:pPr algn="r"/>
-            <a:r>
-              <a:rPr lang="en-US" sz="1400">
-                <a:latin typeface="Times New Roman"/>
-              </a:rPr>
-              <a:t>&lt;date/time&gt;</a:t>
-            </a:r>
-            <a:endParaRPr/>
-          </a:p>
-        </p:txBody>
-      </p:sp>
-      <p:sp>
-        <p:nvSpPr>
-          <p:cNvPr id="53" name="PlaceHolder 4"/>
-          <p:cNvSpPr>
-            <a:spLocks noGrp="1"/>
-          </p:cNvSpPr>
-          <p:nvPr>
-            <p:ph type="ftr"/>
-          </p:nvPr>
-        </p:nvSpPr>
-        <p:spPr>
-          <a:xfrm>
-            <a:off x="0" y="9555480"/>
-            <a:ext cx="3372840" cy="502560"/>
-          </a:xfrm>
-          <a:prstGeom prst="rect">
-            <a:avLst/>
-          </a:prstGeom>
-        </p:spPr>
-        <p:txBody>
-          <a:bodyPr lIns="0" rIns="0" tIns="0" bIns="0" anchor="b"/>
-          <a:p>
-            <a:r>
-              <a:rPr lang="en-US" sz="1400">
-                <a:latin typeface="Times New Roman"/>
-              </a:rPr>
-              <a:t>&lt;footer&gt;</a:t>
-            </a:r>
-            <a:endParaRPr/>
-          </a:p>
-        </p:txBody>
-      </p:sp>
-      <p:sp>
-        <p:nvSpPr>
-          <p:cNvPr id="54" name="PlaceHolder 5"/>
-          <p:cNvSpPr>
-            <a:spLocks noGrp="1"/>
-          </p:cNvSpPr>
-          <p:nvPr>
-            <p:ph type="sldNum"/>
-          </p:nvPr>
-        </p:nvSpPr>
-        <p:spPr>
-          <a:xfrm>
-            <a:off x="4399200" y="9555480"/>
-            <a:ext cx="3372840" cy="502560"/>
-          </a:xfrm>
-          <a:prstGeom prst="rect">
-            <a:avLst/>
-          </a:prstGeom>
-        </p:spPr>
-        <p:txBody>
-          <a:bodyPr lIns="0" rIns="0" tIns="0" bIns="0" anchor="b"/>
-          <a:p>
-            <a:pPr algn="r"/>
-            <a:fld id="{566E8993-B825-43B2-8CD0-9AE6EC9F2008}" type="slidenum">
-              <a:rPr lang="en-US" sz="1400">
-                <a:latin typeface="Times New Roman"/>
-              </a:rPr>
-              <a:t>&lt;number&gt;</a:t>
-            </a:fld>
-            <a:endParaRPr/>
-          </a:p>
-        </p:txBody>
-      </p:sp>
-    </p:spTree>
-  </p:cSld>
-  <p:clrMap bg1="lt1" bg2="lt2" tx1="dk1" tx2="dk2" accent1="accent1" accent2="accent2" accent3="accent3" accent4="accent4" accent5="accent5" accent6="accent6" hlink="hlink" folHlink="folHlink"/>
-</p:notesMaster>
-</file>
-
-<file path=ppt/notesSlides/notesSlide1.xml><?xml version="1.0" encoding="utf-8"?>
-<p:notes xmlns:a="http://schemas.openxmlformats.org/drawingml/2006/main" xmlns:p="http://schemas.openxmlformats.org/presentationml/2006/main" xmlns:r="http://schemas.openxmlformats.org/officeDocument/2006/relationships">
-  <p:cSld>
-    <p:spTree>
-      <p:nvGrpSpPr>
-        <p:cNvPr id="1" name=""/>
-        <p:cNvGrpSpPr/>
-        <p:nvPr/>
-      </p:nvGrpSpPr>
-      <p:grpSpPr>
-        <a:xfrm>
-          <a:off x="0" y="0"/>
-          <a:ext cx="0" cy="0"/>
-          <a:chOff x="0" y="0"/>
-          <a:chExt cx="0" cy="0"/>
-        </a:xfrm>
-      </p:grpSpPr>
-      <p:sp>
-        <p:nvSpPr>
           <p:cNvPr id="71" name="PlaceHolder 1"/>
           <p:cNvSpPr>
             <a:spLocks noGrp="1"/>
@@ -238,6 +440,7 @@
         </p:spPr>
         <p:txBody>
           <a:bodyPr/>
+          <a:lstStyle/>
           <a:p>
             <a:endParaRPr/>
           </a:p>
@@ -260,6 +463,7 @@
         </p:spPr>
         <p:txBody>
           <a:bodyPr anchor="b"/>
+          <a:lstStyle/>
           <a:p>
             <a:pPr algn="r">
               <a:lnSpc>
@@ -274,19 +478,27 @@
                 <a:latin typeface="+mn-lt"/>
                 <a:ea typeface="+mn-ea"/>
               </a:rPr>
-              <a:t>&lt;number&gt;</a:t>
+              <a:t>1</a:t>
             </a:fld>
             <a:endParaRPr/>
           </a:p>
         </p:txBody>
       </p:sp>
     </p:spTree>
+    <p:extLst>
+      <p:ext uri="{BB962C8B-B14F-4D97-AF65-F5344CB8AC3E}">
+        <p14:creationId xmlns:p14="http://schemas.microsoft.com/office/powerpoint/2010/main" val="482671861"/>
+      </p:ext>
+    </p:extLst>
   </p:cSld>
+  <p:clrMapOvr>
+    <a:masterClrMapping/>
+  </p:clrMapOvr>
 </p:notes>
 </file>
 
 <file path=ppt/slideLayouts/slideLayout1.xml><?xml version="1.0" encoding="utf-8"?>
-<p:sldLayout xmlns:a="http://schemas.openxmlformats.org/drawingml/2006/main" xmlns:p="http://schemas.openxmlformats.org/presentationml/2006/main" xmlns:r="http://schemas.openxmlformats.org/officeDocument/2006/relationships" type="blank" preserve="1">
+<p:sldLayout xmlns:a="http://schemas.openxmlformats.org/drawingml/2006/main" xmlns:r="http://schemas.openxmlformats.org/officeDocument/2006/relationships" xmlns:p="http://schemas.openxmlformats.org/presentationml/2006/main" type="blank" preserve="1">
   <p:cSld name="Blank Slide">
     <p:spTree>
       <p:nvGrpSpPr>
@@ -304,11 +516,14 @@
       </p:grpSpPr>
     </p:spTree>
   </p:cSld>
+  <p:clrMapOvr>
+    <a:masterClrMapping/>
+  </p:clrMapOvr>
 </p:sldLayout>
 </file>
 
 <file path=ppt/slideLayouts/slideLayout10.xml><?xml version="1.0" encoding="utf-8"?>
-<p:sldLayout xmlns:a="http://schemas.openxmlformats.org/drawingml/2006/main" xmlns:p="http://schemas.openxmlformats.org/presentationml/2006/main" xmlns:r="http://schemas.openxmlformats.org/officeDocument/2006/relationships" type="objOverTx" preserve="1">
+<p:sldLayout xmlns:a="http://schemas.openxmlformats.org/drawingml/2006/main" xmlns:r="http://schemas.openxmlformats.org/officeDocument/2006/relationships" xmlns:p="http://schemas.openxmlformats.org/presentationml/2006/main" type="objOverTx" preserve="1">
   <p:cSld name="Title, Content over Content">
     <p:spTree>
       <p:nvGrpSpPr>
@@ -344,7 +559,8 @@
           </a:prstGeom>
         </p:spPr>
         <p:txBody>
-          <a:bodyPr lIns="0" rIns="0" tIns="0" bIns="0" anchor="ctr"/>
+          <a:bodyPr lIns="0" tIns="0" rIns="0" bIns="0" anchor="ctr"/>
+          <a:lstStyle/>
           <a:p>
             <a:endParaRPr/>
           </a:p>
@@ -370,7 +586,8 @@
           </a:prstGeom>
         </p:spPr>
         <p:txBody>
-          <a:bodyPr lIns="0" rIns="0" tIns="0" bIns="0"/>
+          <a:bodyPr lIns="0" tIns="0" rIns="0" bIns="0"/>
+          <a:lstStyle/>
           <a:p>
             <a:endParaRPr/>
           </a:p>
@@ -396,7 +613,8 @@
           </a:prstGeom>
         </p:spPr>
         <p:txBody>
-          <a:bodyPr lIns="0" rIns="0" tIns="0" bIns="0"/>
+          <a:bodyPr lIns="0" tIns="0" rIns="0" bIns="0"/>
+          <a:lstStyle/>
           <a:p>
             <a:endParaRPr/>
           </a:p>
@@ -404,11 +622,14 @@
       </p:sp>
     </p:spTree>
   </p:cSld>
+  <p:clrMapOvr>
+    <a:masterClrMapping/>
+  </p:clrMapOvr>
 </p:sldLayout>
 </file>
 
 <file path=ppt/slideLayouts/slideLayout11.xml><?xml version="1.0" encoding="utf-8"?>
-<p:sldLayout xmlns:a="http://schemas.openxmlformats.org/drawingml/2006/main" xmlns:p="http://schemas.openxmlformats.org/presentationml/2006/main" xmlns:r="http://schemas.openxmlformats.org/officeDocument/2006/relationships" type="fourObj" preserve="1">
+<p:sldLayout xmlns:a="http://schemas.openxmlformats.org/drawingml/2006/main" xmlns:r="http://schemas.openxmlformats.org/officeDocument/2006/relationships" xmlns:p="http://schemas.openxmlformats.org/presentationml/2006/main" type="fourObj" preserve="1">
   <p:cSld name="Title, 4 Content">
     <p:spTree>
       <p:nvGrpSpPr>
@@ -444,7 +665,8 @@
           </a:prstGeom>
         </p:spPr>
         <p:txBody>
-          <a:bodyPr lIns="0" rIns="0" tIns="0" bIns="0" anchor="ctr"/>
+          <a:bodyPr lIns="0" tIns="0" rIns="0" bIns="0" anchor="ctr"/>
+          <a:lstStyle/>
           <a:p>
             <a:endParaRPr/>
           </a:p>
@@ -470,7 +692,8 @@
           </a:prstGeom>
         </p:spPr>
         <p:txBody>
-          <a:bodyPr lIns="0" rIns="0" tIns="0" bIns="0"/>
+          <a:bodyPr lIns="0" tIns="0" rIns="0" bIns="0"/>
+          <a:lstStyle/>
           <a:p>
             <a:endParaRPr/>
           </a:p>
@@ -496,7 +719,8 @@
           </a:prstGeom>
         </p:spPr>
         <p:txBody>
-          <a:bodyPr lIns="0" rIns="0" tIns="0" bIns="0"/>
+          <a:bodyPr lIns="0" tIns="0" rIns="0" bIns="0"/>
+          <a:lstStyle/>
           <a:p>
             <a:endParaRPr/>
           </a:p>
@@ -522,7 +746,8 @@
           </a:prstGeom>
         </p:spPr>
         <p:txBody>
-          <a:bodyPr lIns="0" rIns="0" tIns="0" bIns="0"/>
+          <a:bodyPr lIns="0" tIns="0" rIns="0" bIns="0"/>
+          <a:lstStyle/>
           <a:p>
             <a:endParaRPr/>
           </a:p>
@@ -548,7 +773,8 @@
           </a:prstGeom>
         </p:spPr>
         <p:txBody>
-          <a:bodyPr lIns="0" rIns="0" tIns="0" bIns="0"/>
+          <a:bodyPr lIns="0" tIns="0" rIns="0" bIns="0"/>
+          <a:lstStyle/>
           <a:p>
             <a:endParaRPr/>
           </a:p>
@@ -556,11 +782,14 @@
       </p:sp>
     </p:spTree>
   </p:cSld>
+  <p:clrMapOvr>
+    <a:masterClrMapping/>
+  </p:clrMapOvr>
 </p:sldLayout>
 </file>
 
 <file path=ppt/slideLayouts/slideLayout12.xml><?xml version="1.0" encoding="utf-8"?>
-<p:sldLayout xmlns:a="http://schemas.openxmlformats.org/drawingml/2006/main" xmlns:p="http://schemas.openxmlformats.org/presentationml/2006/main" xmlns:r="http://schemas.openxmlformats.org/officeDocument/2006/relationships" type="blank" preserve="1">
+<p:sldLayout xmlns:a="http://schemas.openxmlformats.org/drawingml/2006/main" xmlns:r="http://schemas.openxmlformats.org/officeDocument/2006/relationships" xmlns:p="http://schemas.openxmlformats.org/presentationml/2006/main" type="blank" preserve="1">
   <p:cSld name="Title, 6 Content">
     <p:spTree>
       <p:nvGrpSpPr>
@@ -596,7 +825,8 @@
           </a:prstGeom>
         </p:spPr>
         <p:txBody>
-          <a:bodyPr lIns="0" rIns="0" tIns="0" bIns="0" anchor="ctr"/>
+          <a:bodyPr lIns="0" tIns="0" rIns="0" bIns="0" anchor="ctr"/>
+          <a:lstStyle/>
           <a:p>
             <a:endParaRPr/>
           </a:p>
@@ -622,7 +852,8 @@
           </a:prstGeom>
         </p:spPr>
         <p:txBody>
-          <a:bodyPr lIns="0" rIns="0" tIns="0" bIns="0"/>
+          <a:bodyPr lIns="0" tIns="0" rIns="0" bIns="0"/>
+          <a:lstStyle/>
           <a:p>
             <a:endParaRPr/>
           </a:p>
@@ -648,7 +879,8 @@
           </a:prstGeom>
         </p:spPr>
         <p:txBody>
-          <a:bodyPr lIns="0" rIns="0" tIns="0" bIns="0"/>
+          <a:bodyPr lIns="0" tIns="0" rIns="0" bIns="0"/>
+          <a:lstStyle/>
           <a:p>
             <a:endParaRPr/>
           </a:p>
@@ -656,7 +888,7 @@
       </p:sp>
       <p:pic>
         <p:nvPicPr>
-          <p:cNvPr id="48" name="" descr=""/>
+          <p:cNvPr id="48" name="Picture 47"/>
           <p:cNvPicPr/>
           <p:nvPr/>
         </p:nvPicPr>
@@ -681,12 +913,12 @@
       </p:pic>
       <p:pic>
         <p:nvPicPr>
-          <p:cNvPr id="49" name="" descr=""/>
+          <p:cNvPr id="49" name="Picture 48"/>
           <p:cNvPicPr/>
           <p:nvPr/>
         </p:nvPicPr>
         <p:blipFill>
-          <a:blip r:embed="rId3"/>
+          <a:blip r:embed="rId2"/>
           <a:stretch>
             <a:fillRect/>
           </a:stretch>
@@ -706,11 +938,14 @@
       </p:pic>
     </p:spTree>
   </p:cSld>
+  <p:clrMapOvr>
+    <a:masterClrMapping/>
+  </p:clrMapOvr>
 </p:sldLayout>
 </file>
 
 <file path=ppt/slideLayouts/slideLayout2.xml><?xml version="1.0" encoding="utf-8"?>
-<p:sldLayout xmlns:a="http://schemas.openxmlformats.org/drawingml/2006/main" xmlns:p="http://schemas.openxmlformats.org/presentationml/2006/main" xmlns:r="http://schemas.openxmlformats.org/officeDocument/2006/relationships" type="tx" preserve="1">
+<p:sldLayout xmlns:a="http://schemas.openxmlformats.org/drawingml/2006/main" xmlns:r="http://schemas.openxmlformats.org/officeDocument/2006/relationships" xmlns:p="http://schemas.openxmlformats.org/presentationml/2006/main" type="tx" preserve="1">
   <p:cSld name="Title Slide">
     <p:spTree>
       <p:nvGrpSpPr>
@@ -746,7 +981,8 @@
           </a:prstGeom>
         </p:spPr>
         <p:txBody>
-          <a:bodyPr lIns="0" rIns="0" tIns="0" bIns="0" anchor="ctr"/>
+          <a:bodyPr lIns="0" tIns="0" rIns="0" bIns="0" anchor="ctr"/>
+          <a:lstStyle/>
           <a:p>
             <a:endParaRPr/>
           </a:p>
@@ -772,7 +1008,8 @@
           </a:prstGeom>
         </p:spPr>
         <p:txBody>
-          <a:bodyPr lIns="0" rIns="0" tIns="0" bIns="0" anchor="ctr"/>
+          <a:bodyPr lIns="0" tIns="0" rIns="0" bIns="0" anchor="ctr"/>
+          <a:lstStyle/>
           <a:p>
             <a:pPr algn="ctr"/>
             <a:endParaRPr/>
@@ -781,11 +1018,14 @@
       </p:sp>
     </p:spTree>
   </p:cSld>
+  <p:clrMapOvr>
+    <a:masterClrMapping/>
+  </p:clrMapOvr>
 </p:sldLayout>
 </file>
 
 <file path=ppt/slideLayouts/slideLayout3.xml><?xml version="1.0" encoding="utf-8"?>
-<p:sldLayout xmlns:a="http://schemas.openxmlformats.org/drawingml/2006/main" xmlns:p="http://schemas.openxmlformats.org/presentationml/2006/main" xmlns:r="http://schemas.openxmlformats.org/officeDocument/2006/relationships" type="obj" preserve="1">
+<p:sldLayout xmlns:a="http://schemas.openxmlformats.org/drawingml/2006/main" xmlns:r="http://schemas.openxmlformats.org/officeDocument/2006/relationships" xmlns:p="http://schemas.openxmlformats.org/presentationml/2006/main" type="obj" preserve="1">
   <p:cSld name="Title, Content">
     <p:spTree>
       <p:nvGrpSpPr>
@@ -821,7 +1061,8 @@
           </a:prstGeom>
         </p:spPr>
         <p:txBody>
-          <a:bodyPr lIns="0" rIns="0" tIns="0" bIns="0" anchor="ctr"/>
+          <a:bodyPr lIns="0" tIns="0" rIns="0" bIns="0" anchor="ctr"/>
+          <a:lstStyle/>
           <a:p>
             <a:endParaRPr/>
           </a:p>
@@ -847,7 +1088,8 @@
           </a:prstGeom>
         </p:spPr>
         <p:txBody>
-          <a:bodyPr lIns="0" rIns="0" tIns="0" bIns="0"/>
+          <a:bodyPr lIns="0" tIns="0" rIns="0" bIns="0"/>
+          <a:lstStyle/>
           <a:p>
             <a:endParaRPr/>
           </a:p>
@@ -855,11 +1097,14 @@
       </p:sp>
     </p:spTree>
   </p:cSld>
+  <p:clrMapOvr>
+    <a:masterClrMapping/>
+  </p:clrMapOvr>
 </p:sldLayout>
 </file>
 
 <file path=ppt/slideLayouts/slideLayout4.xml><?xml version="1.0" encoding="utf-8"?>
-<p:sldLayout xmlns:a="http://schemas.openxmlformats.org/drawingml/2006/main" xmlns:p="http://schemas.openxmlformats.org/presentationml/2006/main" xmlns:r="http://schemas.openxmlformats.org/officeDocument/2006/relationships" type="twoObj" preserve="1">
+<p:sldLayout xmlns:a="http://schemas.openxmlformats.org/drawingml/2006/main" xmlns:r="http://schemas.openxmlformats.org/officeDocument/2006/relationships" xmlns:p="http://schemas.openxmlformats.org/presentationml/2006/main" type="twoObj" preserve="1">
   <p:cSld name="Title, 2 Content">
     <p:spTree>
       <p:nvGrpSpPr>
@@ -895,7 +1140,8 @@
           </a:prstGeom>
         </p:spPr>
         <p:txBody>
-          <a:bodyPr lIns="0" rIns="0" tIns="0" bIns="0" anchor="ctr"/>
+          <a:bodyPr lIns="0" tIns="0" rIns="0" bIns="0" anchor="ctr"/>
+          <a:lstStyle/>
           <a:p>
             <a:endParaRPr/>
           </a:p>
@@ -921,7 +1167,8 @@
           </a:prstGeom>
         </p:spPr>
         <p:txBody>
-          <a:bodyPr lIns="0" rIns="0" tIns="0" bIns="0"/>
+          <a:bodyPr lIns="0" tIns="0" rIns="0" bIns="0"/>
+          <a:lstStyle/>
           <a:p>
             <a:endParaRPr/>
           </a:p>
@@ -947,7 +1194,8 @@
           </a:prstGeom>
         </p:spPr>
         <p:txBody>
-          <a:bodyPr lIns="0" rIns="0" tIns="0" bIns="0"/>
+          <a:bodyPr lIns="0" tIns="0" rIns="0" bIns="0"/>
+          <a:lstStyle/>
           <a:p>
             <a:endParaRPr/>
           </a:p>
@@ -955,11 +1203,14 @@
       </p:sp>
     </p:spTree>
   </p:cSld>
+  <p:clrMapOvr>
+    <a:masterClrMapping/>
+  </p:clrMapOvr>
 </p:sldLayout>
 </file>
 
 <file path=ppt/slideLayouts/slideLayout5.xml><?xml version="1.0" encoding="utf-8"?>
-<p:sldLayout xmlns:a="http://schemas.openxmlformats.org/drawingml/2006/main" xmlns:p="http://schemas.openxmlformats.org/presentationml/2006/main" xmlns:r="http://schemas.openxmlformats.org/officeDocument/2006/relationships" type="titleOnly" preserve="1">
+<p:sldLayout xmlns:a="http://schemas.openxmlformats.org/drawingml/2006/main" xmlns:r="http://schemas.openxmlformats.org/officeDocument/2006/relationships" xmlns:p="http://schemas.openxmlformats.org/presentationml/2006/main" type="titleOnly" preserve="1">
   <p:cSld name="Title Only">
     <p:spTree>
       <p:nvGrpSpPr>
@@ -995,7 +1246,8 @@
           </a:prstGeom>
         </p:spPr>
         <p:txBody>
-          <a:bodyPr lIns="0" rIns="0" tIns="0" bIns="0" anchor="ctr"/>
+          <a:bodyPr lIns="0" tIns="0" rIns="0" bIns="0" anchor="ctr"/>
+          <a:lstStyle/>
           <a:p>
             <a:endParaRPr/>
           </a:p>
@@ -1003,11 +1255,14 @@
       </p:sp>
     </p:spTree>
   </p:cSld>
+  <p:clrMapOvr>
+    <a:masterClrMapping/>
+  </p:clrMapOvr>
 </p:sldLayout>
 </file>
 
 <file path=ppt/slideLayouts/slideLayout6.xml><?xml version="1.0" encoding="utf-8"?>
-<p:sldLayout xmlns:a="http://schemas.openxmlformats.org/drawingml/2006/main" xmlns:p="http://schemas.openxmlformats.org/presentationml/2006/main" xmlns:r="http://schemas.openxmlformats.org/officeDocument/2006/relationships" type="objOnly" preserve="1">
+<p:sldLayout xmlns:a="http://schemas.openxmlformats.org/drawingml/2006/main" xmlns:r="http://schemas.openxmlformats.org/officeDocument/2006/relationships" xmlns:p="http://schemas.openxmlformats.org/presentationml/2006/main" type="objOnly" preserve="1">
   <p:cSld name="Centered Text">
     <p:spTree>
       <p:nvGrpSpPr>
@@ -1043,7 +1298,8 @@
           </a:prstGeom>
         </p:spPr>
         <p:txBody>
-          <a:bodyPr lIns="0" rIns="0" tIns="0" bIns="0" anchor="ctr"/>
+          <a:bodyPr lIns="0" tIns="0" rIns="0" bIns="0" anchor="ctr"/>
+          <a:lstStyle/>
           <a:p>
             <a:pPr algn="ctr"/>
             <a:endParaRPr/>
@@ -1052,11 +1308,14 @@
       </p:sp>
     </p:spTree>
   </p:cSld>
+  <p:clrMapOvr>
+    <a:masterClrMapping/>
+  </p:clrMapOvr>
 </p:sldLayout>
 </file>
 
 <file path=ppt/slideLayouts/slideLayout7.xml><?xml version="1.0" encoding="utf-8"?>
-<p:sldLayout xmlns:a="http://schemas.openxmlformats.org/drawingml/2006/main" xmlns:p="http://schemas.openxmlformats.org/presentationml/2006/main" xmlns:r="http://schemas.openxmlformats.org/officeDocument/2006/relationships" type="twoObjAndObj" preserve="1">
+<p:sldLayout xmlns:a="http://schemas.openxmlformats.org/drawingml/2006/main" xmlns:r="http://schemas.openxmlformats.org/officeDocument/2006/relationships" xmlns:p="http://schemas.openxmlformats.org/presentationml/2006/main" type="twoObjAndObj" preserve="1">
   <p:cSld name="Title, 2 Content and Content">
     <p:spTree>
       <p:nvGrpSpPr>
@@ -1092,7 +1351,8 @@
           </a:prstGeom>
         </p:spPr>
         <p:txBody>
-          <a:bodyPr lIns="0" rIns="0" tIns="0" bIns="0" anchor="ctr"/>
+          <a:bodyPr lIns="0" tIns="0" rIns="0" bIns="0" anchor="ctr"/>
+          <a:lstStyle/>
           <a:p>
             <a:endParaRPr/>
           </a:p>
@@ -1118,7 +1378,8 @@
           </a:prstGeom>
         </p:spPr>
         <p:txBody>
-          <a:bodyPr lIns="0" rIns="0" tIns="0" bIns="0"/>
+          <a:bodyPr lIns="0" tIns="0" rIns="0" bIns="0"/>
+          <a:lstStyle/>
           <a:p>
             <a:endParaRPr/>
           </a:p>
@@ -1144,7 +1405,8 @@
           </a:prstGeom>
         </p:spPr>
         <p:txBody>
-          <a:bodyPr lIns="0" rIns="0" tIns="0" bIns="0"/>
+          <a:bodyPr lIns="0" tIns="0" rIns="0" bIns="0"/>
+          <a:lstStyle/>
           <a:p>
             <a:endParaRPr/>
           </a:p>
@@ -1170,7 +1432,8 @@
           </a:prstGeom>
         </p:spPr>
         <p:txBody>
-          <a:bodyPr lIns="0" rIns="0" tIns="0" bIns="0"/>
+          <a:bodyPr lIns="0" tIns="0" rIns="0" bIns="0"/>
+          <a:lstStyle/>
           <a:p>
             <a:endParaRPr/>
           </a:p>
@@ -1178,11 +1441,14 @@
       </p:sp>
     </p:spTree>
   </p:cSld>
+  <p:clrMapOvr>
+    <a:masterClrMapping/>
+  </p:clrMapOvr>
 </p:sldLayout>
 </file>
 
 <file path=ppt/slideLayouts/slideLayout8.xml><?xml version="1.0" encoding="utf-8"?>
-<p:sldLayout xmlns:a="http://schemas.openxmlformats.org/drawingml/2006/main" xmlns:p="http://schemas.openxmlformats.org/presentationml/2006/main" xmlns:r="http://schemas.openxmlformats.org/officeDocument/2006/relationships" type="objAndTwoObj" preserve="1">
+<p:sldLayout xmlns:a="http://schemas.openxmlformats.org/drawingml/2006/main" xmlns:r="http://schemas.openxmlformats.org/officeDocument/2006/relationships" xmlns:p="http://schemas.openxmlformats.org/presentationml/2006/main" type="objAndTwoObj" preserve="1">
   <p:cSld name="Title Content and 2 Content">
     <p:spTree>
       <p:nvGrpSpPr>
@@ -1218,7 +1484,8 @@
           </a:prstGeom>
         </p:spPr>
         <p:txBody>
-          <a:bodyPr lIns="0" rIns="0" tIns="0" bIns="0" anchor="ctr"/>
+          <a:bodyPr lIns="0" tIns="0" rIns="0" bIns="0" anchor="ctr"/>
+          <a:lstStyle/>
           <a:p>
             <a:endParaRPr/>
           </a:p>
@@ -1244,7 +1511,8 @@
           </a:prstGeom>
         </p:spPr>
         <p:txBody>
-          <a:bodyPr lIns="0" rIns="0" tIns="0" bIns="0"/>
+          <a:bodyPr lIns="0" tIns="0" rIns="0" bIns="0"/>
+          <a:lstStyle/>
           <a:p>
             <a:endParaRPr/>
           </a:p>
@@ -1270,7 +1538,8 @@
           </a:prstGeom>
         </p:spPr>
         <p:txBody>
-          <a:bodyPr lIns="0" rIns="0" tIns="0" bIns="0"/>
+          <a:bodyPr lIns="0" tIns="0" rIns="0" bIns="0"/>
+          <a:lstStyle/>
           <a:p>
             <a:endParaRPr/>
           </a:p>
@@ -1296,7 +1565,8 @@
           </a:prstGeom>
         </p:spPr>
         <p:txBody>
-          <a:bodyPr lIns="0" rIns="0" tIns="0" bIns="0"/>
+          <a:bodyPr lIns="0" tIns="0" rIns="0" bIns="0"/>
+          <a:lstStyle/>
           <a:p>
             <a:endParaRPr/>
           </a:p>
@@ -1304,11 +1574,14 @@
       </p:sp>
     </p:spTree>
   </p:cSld>
+  <p:clrMapOvr>
+    <a:masterClrMapping/>
+  </p:clrMapOvr>
 </p:sldLayout>
 </file>
 
 <file path=ppt/slideLayouts/slideLayout9.xml><?xml version="1.0" encoding="utf-8"?>
-<p:sldLayout xmlns:a="http://schemas.openxmlformats.org/drawingml/2006/main" xmlns:p="http://schemas.openxmlformats.org/presentationml/2006/main" xmlns:r="http://schemas.openxmlformats.org/officeDocument/2006/relationships" type="twoObjOverTx" preserve="1">
+<p:sldLayout xmlns:a="http://schemas.openxmlformats.org/drawingml/2006/main" xmlns:r="http://schemas.openxmlformats.org/officeDocument/2006/relationships" xmlns:p="http://schemas.openxmlformats.org/presentationml/2006/main" type="twoObjOverTx" preserve="1">
   <p:cSld name="Title, 2 Content over Content">
     <p:spTree>
       <p:nvGrpSpPr>
@@ -1344,7 +1617,8 @@
           </a:prstGeom>
         </p:spPr>
         <p:txBody>
-          <a:bodyPr lIns="0" rIns="0" tIns="0" bIns="0" anchor="ctr"/>
+          <a:bodyPr lIns="0" tIns="0" rIns="0" bIns="0" anchor="ctr"/>
+          <a:lstStyle/>
           <a:p>
             <a:endParaRPr/>
           </a:p>
@@ -1370,7 +1644,8 @@
           </a:prstGeom>
         </p:spPr>
         <p:txBody>
-          <a:bodyPr lIns="0" rIns="0" tIns="0" bIns="0"/>
+          <a:bodyPr lIns="0" tIns="0" rIns="0" bIns="0"/>
+          <a:lstStyle/>
           <a:p>
             <a:endParaRPr/>
           </a:p>
@@ -1396,7 +1671,8 @@
           </a:prstGeom>
         </p:spPr>
         <p:txBody>
-          <a:bodyPr lIns="0" rIns="0" tIns="0" bIns="0"/>
+          <a:bodyPr lIns="0" tIns="0" rIns="0" bIns="0"/>
+          <a:lstStyle/>
           <a:p>
             <a:endParaRPr/>
           </a:p>
@@ -1422,7 +1698,8 @@
           </a:prstGeom>
         </p:spPr>
         <p:txBody>
-          <a:bodyPr lIns="0" rIns="0" tIns="0" bIns="0"/>
+          <a:bodyPr lIns="0" tIns="0" rIns="0" bIns="0"/>
+          <a:lstStyle/>
           <a:p>
             <a:endParaRPr/>
           </a:p>
@@ -1430,17 +1707,21 @@
       </p:sp>
     </p:spTree>
   </p:cSld>
+  <p:clrMapOvr>
+    <a:masterClrMapping/>
+  </p:clrMapOvr>
 </p:sldLayout>
 </file>
 
 <file path=ppt/slideMasters/slideMaster1.xml><?xml version="1.0" encoding="utf-8"?>
-<p:sldMaster xmlns:a="http://schemas.openxmlformats.org/drawingml/2006/main" xmlns:p="http://schemas.openxmlformats.org/presentationml/2006/main" xmlns:r="http://schemas.openxmlformats.org/officeDocument/2006/relationships">
+<p:sldMaster xmlns:a="http://schemas.openxmlformats.org/drawingml/2006/main" xmlns:r="http://schemas.openxmlformats.org/officeDocument/2006/relationships" xmlns:p="http://schemas.openxmlformats.org/presentationml/2006/main">
   <p:cSld>
     <p:bg>
       <p:bgPr>
         <a:solidFill>
-          <a:srgbClr val="ffffff"/>
+          <a:srgbClr val="FFFFFF"/>
         </a:solidFill>
+        <a:effectLst/>
       </p:bgPr>
     </p:bg>
     <p:spTree>
@@ -1459,7 +1740,7 @@
       </p:grpSpPr>
       <p:sp>
         <p:nvSpPr>
-          <p:cNvPr id="0" name="CustomShape 1"/>
+          <p:cNvPr id="16" name="CustomShape 1"/>
           <p:cNvSpPr/>
           <p:nvPr/>
         </p:nvSpPr>
@@ -1472,7 +1753,7 @@
             <a:avLst/>
           </a:prstGeom>
           <a:solidFill>
-            <a:srgbClr val="f2f2f2"/>
+            <a:srgbClr val="F2F2F2"/>
           </a:solidFill>
           <a:ln w="9360">
             <a:noFill/>
@@ -1481,7 +1762,7 @@
       </p:sp>
       <p:sp>
         <p:nvSpPr>
-          <p:cNvPr id="1" name="Line 2"/>
+          <p:cNvPr id="17" name="Line 2"/>
           <p:cNvSpPr/>
           <p:nvPr/>
         </p:nvSpPr>
@@ -1495,7 +1776,7 @@
           </a:prstGeom>
           <a:ln w="12600">
             <a:solidFill>
-              <a:srgbClr val="ffffff"/>
+              <a:srgbClr val="FFFFFF"/>
             </a:solidFill>
             <a:custDash>
               <a:ds d="140000" sp="105000"/>
@@ -1519,7 +1800,7 @@
             <a:avLst/>
           </a:prstGeom>
           <a:solidFill>
-            <a:srgbClr val="f2f2f2"/>
+            <a:srgbClr val="F2F2F2"/>
           </a:solidFill>
           <a:ln w="9360">
             <a:noFill/>
@@ -1528,12 +1809,12 @@
       </p:sp>
       <p:pic>
         <p:nvPicPr>
-          <p:cNvPr id="3" name="Picture 11" descr=""/>
+          <p:cNvPr id="3" name="Picture 11"/>
           <p:cNvPicPr/>
           <p:nvPr/>
         </p:nvPicPr>
         <p:blipFill>
-          <a:blip r:embed="rId2"/>
+          <a:blip r:embed="rId14"/>
           <a:stretch>
             <a:fillRect/>
           </a:stretch>
@@ -1566,7 +1847,7 @@
             <a:avLst/>
           </a:prstGeom>
           <a:solidFill>
-            <a:srgbClr val="d74520"/>
+            <a:srgbClr val="D74520"/>
           </a:solidFill>
           <a:ln w="9360">
             <a:noFill/>
@@ -1588,7 +1869,7 @@
             <a:avLst/>
           </a:prstGeom>
           <a:solidFill>
-            <a:srgbClr val="d74520"/>
+            <a:srgbClr val="D74520"/>
           </a:solidFill>
           <a:ln w="9360">
             <a:noFill/>
@@ -1610,7 +1891,7 @@
             <a:avLst/>
           </a:prstGeom>
           <a:solidFill>
-            <a:srgbClr val="bfbfbf"/>
+            <a:srgbClr val="BFBFBF"/>
           </a:solidFill>
           <a:ln w="9360">
             <a:noFill/>
@@ -1659,17 +1940,18 @@
           </a:ln>
         </p:spPr>
         <p:txBody>
-          <a:bodyPr lIns="90000" rIns="90000" tIns="45000" bIns="45000"/>
-          <a:p>
-            <a:pPr>
-              <a:lnSpc>
-                <a:spcPct val="100000"/>
-              </a:lnSpc>
-            </a:pPr>
-            <a:r>
-              <a:rPr b="1" lang="en-US" sz="4000">
-                <a:solidFill>
-                  <a:srgbClr val="ffffff"/>
+          <a:bodyPr lIns="90000" tIns="45000" rIns="90000" bIns="45000"/>
+          <a:lstStyle/>
+          <a:p>
+            <a:pPr>
+              <a:lnSpc>
+                <a:spcPct val="100000"/>
+              </a:lnSpc>
+            </a:pPr>
+            <a:r>
+              <a:rPr lang="en-US" sz="4000" b="1">
+                <a:solidFill>
+                  <a:srgbClr val="FFFFFF"/>
                 </a:solidFill>
                 <a:latin typeface="Trebuchet MS"/>
               </a:rPr>
@@ -1694,7 +1976,7 @@
             <a:avLst/>
           </a:prstGeom>
           <a:solidFill>
-            <a:srgbClr val="4a6a7e"/>
+            <a:srgbClr val="4A6A7E"/>
           </a:solidFill>
           <a:ln w="9360">
             <a:noFill/>
@@ -1716,7 +1998,7 @@
             <a:avLst/>
           </a:prstGeom>
           <a:solidFill>
-            <a:srgbClr val="d74520"/>
+            <a:srgbClr val="D74520"/>
           </a:solidFill>
           <a:ln w="9360">
             <a:noFill/>
@@ -1743,7 +2025,8 @@
           </a:ln>
         </p:spPr>
         <p:txBody>
-          <a:bodyPr lIns="90000" rIns="90000" tIns="45000" bIns="45000"/>
+          <a:bodyPr lIns="90000" tIns="45000" rIns="90000" bIns="45000"/>
+          <a:lstStyle/>
           <a:p>
             <a:pPr algn="r">
               <a:lnSpc>
@@ -1751,7 +2034,7 @@
               </a:lnSpc>
             </a:pPr>
             <a:r>
-              <a:rPr b="1" lang="en-US" sz="5400">
+              <a:rPr lang="en-US" sz="5400" b="1">
                 <a:solidFill>
                   <a:srgbClr val="000000"/>
                 </a:solidFill>
@@ -1778,7 +2061,7 @@
             <a:avLst/>
           </a:prstGeom>
           <a:solidFill>
-            <a:srgbClr val="4a6a7e"/>
+            <a:srgbClr val="4A6A7E"/>
           </a:solidFill>
           <a:ln w="9360">
             <a:noFill/>
@@ -1827,7 +2110,8 @@
           </a:prstGeom>
         </p:spPr>
         <p:txBody>
-          <a:bodyPr lIns="0" rIns="0" tIns="0" bIns="0" anchor="ctr"/>
+          <a:bodyPr lIns="0" tIns="0" rIns="0" bIns="0" anchor="ctr"/>
+          <a:lstStyle/>
           <a:p>
             <a:r>
               <a:rPr lang="en-US" sz="8600">
@@ -1859,7 +2143,8 @@
           </a:prstGeom>
         </p:spPr>
         <p:txBody>
-          <a:bodyPr lIns="0" rIns="0" tIns="0" bIns="0"/>
+          <a:bodyPr lIns="0" tIns="0" rIns="0" bIns="0"/>
+          <a:lstStyle/>
           <a:p>
             <a:pPr>
               <a:buSzPct val="45000"/>
@@ -1962,26 +2247,306 @@
       </p:sp>
     </p:spTree>
   </p:cSld>
-  <p:clrMap bg1="lt1" bg2="lt2" tx1="dk1" tx2="dk2" accent1="accent1" accent2="accent2" accent3="accent3" accent4="accent4" accent5="accent5" accent6="accent6" hlink="hlink" folHlink="folHlink"/>
+  <p:clrMap bg1="lt1" tx1="dk1" bg2="lt2" tx2="dk2" accent1="accent1" accent2="accent2" accent3="accent3" accent4="accent4" accent5="accent5" accent6="accent6" hlink="hlink" folHlink="folHlink"/>
   <p:sldLayoutIdLst>
-    <p:sldLayoutId id="2147483649" r:id="rId3"/>
-    <p:sldLayoutId id="2147483650" r:id="rId4"/>
-    <p:sldLayoutId id="2147483651" r:id="rId5"/>
-    <p:sldLayoutId id="2147483652" r:id="rId6"/>
-    <p:sldLayoutId id="2147483653" r:id="rId7"/>
-    <p:sldLayoutId id="2147483654" r:id="rId8"/>
-    <p:sldLayoutId id="2147483655" r:id="rId9"/>
-    <p:sldLayoutId id="2147483656" r:id="rId10"/>
-    <p:sldLayoutId id="2147483657" r:id="rId11"/>
-    <p:sldLayoutId id="2147483658" r:id="rId12"/>
-    <p:sldLayoutId id="2147483659" r:id="rId13"/>
-    <p:sldLayoutId id="2147483660" r:id="rId14"/>
+    <p:sldLayoutId id="2147483649" r:id="rId1"/>
+    <p:sldLayoutId id="2147483650" r:id="rId2"/>
+    <p:sldLayoutId id="2147483651" r:id="rId3"/>
+    <p:sldLayoutId id="2147483652" r:id="rId4"/>
+    <p:sldLayoutId id="2147483653" r:id="rId5"/>
+    <p:sldLayoutId id="2147483654" r:id="rId6"/>
+    <p:sldLayoutId id="2147483655" r:id="rId7"/>
+    <p:sldLayoutId id="2147483656" r:id="rId8"/>
+    <p:sldLayoutId id="2147483657" r:id="rId9"/>
+    <p:sldLayoutId id="2147483658" r:id="rId10"/>
+    <p:sldLayoutId id="2147483659" r:id="rId11"/>
+    <p:sldLayoutId id="2147483660" r:id="rId12"/>
   </p:sldLayoutIdLst>
+  <p:txStyles>
+    <p:titleStyle>
+      <a:lvl1pPr algn="l" defTabSz="914400" rtl="0" eaLnBrk="1" latinLnBrk="0" hangingPunct="1">
+        <a:lnSpc>
+          <a:spcPct val="90000"/>
+        </a:lnSpc>
+        <a:spcBef>
+          <a:spcPct val="0"/>
+        </a:spcBef>
+        <a:buNone/>
+        <a:defRPr sz="4400" kern="1200">
+          <a:solidFill>
+            <a:schemeClr val="tx1"/>
+          </a:solidFill>
+          <a:latin typeface="+mj-lt"/>
+          <a:ea typeface="+mj-ea"/>
+          <a:cs typeface="+mj-cs"/>
+        </a:defRPr>
+      </a:lvl1pPr>
+    </p:titleStyle>
+    <p:bodyStyle>
+      <a:lvl1pPr marL="228600" indent="-228600" algn="l" defTabSz="914400" rtl="0" eaLnBrk="1" latinLnBrk="0" hangingPunct="1">
+        <a:lnSpc>
+          <a:spcPct val="90000"/>
+        </a:lnSpc>
+        <a:spcBef>
+          <a:spcPts val="1000"/>
+        </a:spcBef>
+        <a:buFont typeface="Arial" panose="020B0604020202020204" pitchFamily="34" charset="0"/>
+        <a:buChar char="•"/>
+        <a:defRPr sz="2800" kern="1200">
+          <a:solidFill>
+            <a:schemeClr val="tx1"/>
+          </a:solidFill>
+          <a:latin typeface="+mn-lt"/>
+          <a:ea typeface="+mn-ea"/>
+          <a:cs typeface="+mn-cs"/>
+        </a:defRPr>
+      </a:lvl1pPr>
+      <a:lvl2pPr marL="685800" indent="-228600" algn="l" defTabSz="914400" rtl="0" eaLnBrk="1" latinLnBrk="0" hangingPunct="1">
+        <a:lnSpc>
+          <a:spcPct val="90000"/>
+        </a:lnSpc>
+        <a:spcBef>
+          <a:spcPts val="500"/>
+        </a:spcBef>
+        <a:buFont typeface="Arial" panose="020B0604020202020204" pitchFamily="34" charset="0"/>
+        <a:buChar char="•"/>
+        <a:defRPr sz="2400" kern="1200">
+          <a:solidFill>
+            <a:schemeClr val="tx1"/>
+          </a:solidFill>
+          <a:latin typeface="+mn-lt"/>
+          <a:ea typeface="+mn-ea"/>
+          <a:cs typeface="+mn-cs"/>
+        </a:defRPr>
+      </a:lvl2pPr>
+      <a:lvl3pPr marL="1143000" indent="-228600" algn="l" defTabSz="914400" rtl="0" eaLnBrk="1" latinLnBrk="0" hangingPunct="1">
+        <a:lnSpc>
+          <a:spcPct val="90000"/>
+        </a:lnSpc>
+        <a:spcBef>
+          <a:spcPts val="500"/>
+        </a:spcBef>
+        <a:buFont typeface="Arial" panose="020B0604020202020204" pitchFamily="34" charset="0"/>
+        <a:buChar char="•"/>
+        <a:defRPr sz="2000" kern="1200">
+          <a:solidFill>
+            <a:schemeClr val="tx1"/>
+          </a:solidFill>
+          <a:latin typeface="+mn-lt"/>
+          <a:ea typeface="+mn-ea"/>
+          <a:cs typeface="+mn-cs"/>
+        </a:defRPr>
+      </a:lvl3pPr>
+      <a:lvl4pPr marL="1600200" indent="-228600" algn="l" defTabSz="914400" rtl="0" eaLnBrk="1" latinLnBrk="0" hangingPunct="1">
+        <a:lnSpc>
+          <a:spcPct val="90000"/>
+        </a:lnSpc>
+        <a:spcBef>
+          <a:spcPts val="500"/>
+        </a:spcBef>
+        <a:buFont typeface="Arial" panose="020B0604020202020204" pitchFamily="34" charset="0"/>
+        <a:buChar char="•"/>
+        <a:defRPr sz="1800" kern="1200">
+          <a:solidFill>
+            <a:schemeClr val="tx1"/>
+          </a:solidFill>
+          <a:latin typeface="+mn-lt"/>
+          <a:ea typeface="+mn-ea"/>
+          <a:cs typeface="+mn-cs"/>
+        </a:defRPr>
+      </a:lvl4pPr>
+      <a:lvl5pPr marL="2057400" indent="-228600" algn="l" defTabSz="914400" rtl="0" eaLnBrk="1" latinLnBrk="0" hangingPunct="1">
+        <a:lnSpc>
+          <a:spcPct val="90000"/>
+        </a:lnSpc>
+        <a:spcBef>
+          <a:spcPts val="500"/>
+        </a:spcBef>
+        <a:buFont typeface="Arial" panose="020B0604020202020204" pitchFamily="34" charset="0"/>
+        <a:buChar char="•"/>
+        <a:defRPr sz="1800" kern="1200">
+          <a:solidFill>
+            <a:schemeClr val="tx1"/>
+          </a:solidFill>
+          <a:latin typeface="+mn-lt"/>
+          <a:ea typeface="+mn-ea"/>
+          <a:cs typeface="+mn-cs"/>
+        </a:defRPr>
+      </a:lvl5pPr>
+      <a:lvl6pPr marL="2514600" indent="-228600" algn="l" defTabSz="914400" rtl="0" eaLnBrk="1" latinLnBrk="0" hangingPunct="1">
+        <a:lnSpc>
+          <a:spcPct val="90000"/>
+        </a:lnSpc>
+        <a:spcBef>
+          <a:spcPts val="500"/>
+        </a:spcBef>
+        <a:buFont typeface="Arial" panose="020B0604020202020204" pitchFamily="34" charset="0"/>
+        <a:buChar char="•"/>
+        <a:defRPr sz="1800" kern="1200">
+          <a:solidFill>
+            <a:schemeClr val="tx1"/>
+          </a:solidFill>
+          <a:latin typeface="+mn-lt"/>
+          <a:ea typeface="+mn-ea"/>
+          <a:cs typeface="+mn-cs"/>
+        </a:defRPr>
+      </a:lvl6pPr>
+      <a:lvl7pPr marL="2971800" indent="-228600" algn="l" defTabSz="914400" rtl="0" eaLnBrk="1" latinLnBrk="0" hangingPunct="1">
+        <a:lnSpc>
+          <a:spcPct val="90000"/>
+        </a:lnSpc>
+        <a:spcBef>
+          <a:spcPts val="500"/>
+        </a:spcBef>
+        <a:buFont typeface="Arial" panose="020B0604020202020204" pitchFamily="34" charset="0"/>
+        <a:buChar char="•"/>
+        <a:defRPr sz="1800" kern="1200">
+          <a:solidFill>
+            <a:schemeClr val="tx1"/>
+          </a:solidFill>
+          <a:latin typeface="+mn-lt"/>
+          <a:ea typeface="+mn-ea"/>
+          <a:cs typeface="+mn-cs"/>
+        </a:defRPr>
+      </a:lvl7pPr>
+      <a:lvl8pPr marL="3429000" indent="-228600" algn="l" defTabSz="914400" rtl="0" eaLnBrk="1" latinLnBrk="0" hangingPunct="1">
+        <a:lnSpc>
+          <a:spcPct val="90000"/>
+        </a:lnSpc>
+        <a:spcBef>
+          <a:spcPts val="500"/>
+        </a:spcBef>
+        <a:buFont typeface="Arial" panose="020B0604020202020204" pitchFamily="34" charset="0"/>
+        <a:buChar char="•"/>
+        <a:defRPr sz="1800" kern="1200">
+          <a:solidFill>
+            <a:schemeClr val="tx1"/>
+          </a:solidFill>
+          <a:latin typeface="+mn-lt"/>
+          <a:ea typeface="+mn-ea"/>
+          <a:cs typeface="+mn-cs"/>
+        </a:defRPr>
+      </a:lvl8pPr>
+      <a:lvl9pPr marL="3886200" indent="-228600" algn="l" defTabSz="914400" rtl="0" eaLnBrk="1" latinLnBrk="0" hangingPunct="1">
+        <a:lnSpc>
+          <a:spcPct val="90000"/>
+        </a:lnSpc>
+        <a:spcBef>
+          <a:spcPts val="500"/>
+        </a:spcBef>
+        <a:buFont typeface="Arial" panose="020B0604020202020204" pitchFamily="34" charset="0"/>
+        <a:buChar char="•"/>
+        <a:defRPr sz="1800" kern="1200">
+          <a:solidFill>
+            <a:schemeClr val="tx1"/>
+          </a:solidFill>
+          <a:latin typeface="+mn-lt"/>
+          <a:ea typeface="+mn-ea"/>
+          <a:cs typeface="+mn-cs"/>
+        </a:defRPr>
+      </a:lvl9pPr>
+    </p:bodyStyle>
+    <p:otherStyle>
+      <a:defPPr>
+        <a:defRPr lang="en-US"/>
+      </a:defPPr>
+      <a:lvl1pPr marL="0" algn="l" defTabSz="914400" rtl="0" eaLnBrk="1" latinLnBrk="0" hangingPunct="1">
+        <a:defRPr sz="1800" kern="1200">
+          <a:solidFill>
+            <a:schemeClr val="tx1"/>
+          </a:solidFill>
+          <a:latin typeface="+mn-lt"/>
+          <a:ea typeface="+mn-ea"/>
+          <a:cs typeface="+mn-cs"/>
+        </a:defRPr>
+      </a:lvl1pPr>
+      <a:lvl2pPr marL="457200" algn="l" defTabSz="914400" rtl="0" eaLnBrk="1" latinLnBrk="0" hangingPunct="1">
+        <a:defRPr sz="1800" kern="1200">
+          <a:solidFill>
+            <a:schemeClr val="tx1"/>
+          </a:solidFill>
+          <a:latin typeface="+mn-lt"/>
+          <a:ea typeface="+mn-ea"/>
+          <a:cs typeface="+mn-cs"/>
+        </a:defRPr>
+      </a:lvl2pPr>
+      <a:lvl3pPr marL="914400" algn="l" defTabSz="914400" rtl="0" eaLnBrk="1" latinLnBrk="0" hangingPunct="1">
+        <a:defRPr sz="1800" kern="1200">
+          <a:solidFill>
+            <a:schemeClr val="tx1"/>
+          </a:solidFill>
+          <a:latin typeface="+mn-lt"/>
+          <a:ea typeface="+mn-ea"/>
+          <a:cs typeface="+mn-cs"/>
+        </a:defRPr>
+      </a:lvl3pPr>
+      <a:lvl4pPr marL="1371600" algn="l" defTabSz="914400" rtl="0" eaLnBrk="1" latinLnBrk="0" hangingPunct="1">
+        <a:defRPr sz="1800" kern="1200">
+          <a:solidFill>
+            <a:schemeClr val="tx1"/>
+          </a:solidFill>
+          <a:latin typeface="+mn-lt"/>
+          <a:ea typeface="+mn-ea"/>
+          <a:cs typeface="+mn-cs"/>
+        </a:defRPr>
+      </a:lvl4pPr>
+      <a:lvl5pPr marL="1828800" algn="l" defTabSz="914400" rtl="0" eaLnBrk="1" latinLnBrk="0" hangingPunct="1">
+        <a:defRPr sz="1800" kern="1200">
+          <a:solidFill>
+            <a:schemeClr val="tx1"/>
+          </a:solidFill>
+          <a:latin typeface="+mn-lt"/>
+          <a:ea typeface="+mn-ea"/>
+          <a:cs typeface="+mn-cs"/>
+        </a:defRPr>
+      </a:lvl5pPr>
+      <a:lvl6pPr marL="2286000" algn="l" defTabSz="914400" rtl="0" eaLnBrk="1" latinLnBrk="0" hangingPunct="1">
+        <a:defRPr sz="1800" kern="1200">
+          <a:solidFill>
+            <a:schemeClr val="tx1"/>
+          </a:solidFill>
+          <a:latin typeface="+mn-lt"/>
+          <a:ea typeface="+mn-ea"/>
+          <a:cs typeface="+mn-cs"/>
+        </a:defRPr>
+      </a:lvl6pPr>
+      <a:lvl7pPr marL="2743200" algn="l" defTabSz="914400" rtl="0" eaLnBrk="1" latinLnBrk="0" hangingPunct="1">
+        <a:defRPr sz="1800" kern="1200">
+          <a:solidFill>
+            <a:schemeClr val="tx1"/>
+          </a:solidFill>
+          <a:latin typeface="+mn-lt"/>
+          <a:ea typeface="+mn-ea"/>
+          <a:cs typeface="+mn-cs"/>
+        </a:defRPr>
+      </a:lvl7pPr>
+      <a:lvl8pPr marL="3200400" algn="l" defTabSz="914400" rtl="0" eaLnBrk="1" latinLnBrk="0" hangingPunct="1">
+        <a:defRPr sz="1800" kern="1200">
+          <a:solidFill>
+            <a:schemeClr val="tx1"/>
+          </a:solidFill>
+          <a:latin typeface="+mn-lt"/>
+          <a:ea typeface="+mn-ea"/>
+          <a:cs typeface="+mn-cs"/>
+        </a:defRPr>
+      </a:lvl8pPr>
+      <a:lvl9pPr marL="3657600" algn="l" defTabSz="914400" rtl="0" eaLnBrk="1" latinLnBrk="0" hangingPunct="1">
+        <a:defRPr sz="1800" kern="1200">
+          <a:solidFill>
+            <a:schemeClr val="tx1"/>
+          </a:solidFill>
+          <a:latin typeface="+mn-lt"/>
+          <a:ea typeface="+mn-ea"/>
+          <a:cs typeface="+mn-cs"/>
+        </a:defRPr>
+      </a:lvl9pPr>
+    </p:otherStyle>
+  </p:txStyles>
 </p:sldMaster>
 </file>
 
 <file path=ppt/slides/slide1.xml><?xml version="1.0" encoding="utf-8"?>
-<p:sld xmlns:a="http://schemas.openxmlformats.org/drawingml/2006/main" xmlns:p="http://schemas.openxmlformats.org/presentationml/2006/main" xmlns:r="http://schemas.openxmlformats.org/officeDocument/2006/relationships">
+<p:sld xmlns:a="http://schemas.openxmlformats.org/drawingml/2006/main" xmlns:r="http://schemas.openxmlformats.org/officeDocument/2006/relationships" xmlns:p="http://schemas.openxmlformats.org/presentationml/2006/main">
   <p:cSld>
     <p:spTree>
       <p:nvGrpSpPr>
@@ -2017,14 +2582,14 @@
                 <a:srgbClr val="979797"/>
               </a:gs>
               <a:gs pos="100000">
-                <a:srgbClr val="ffffff"/>
+                <a:srgbClr val="FFFFFF"/>
               </a:gs>
             </a:gsLst>
             <a:path path="circle"/>
           </a:gradFill>
           <a:ln w="9360">
             <a:solidFill>
-              <a:srgbClr val="4a7ebb"/>
+              <a:srgbClr val="4A7EBB"/>
             </a:solidFill>
             <a:round/>
           </a:ln>
@@ -2046,7 +2611,8 @@
           </a:prstGeom>
         </p:spPr>
         <p:txBody>
-          <a:bodyPr lIns="0" rIns="0" tIns="0" bIns="0"/>
+          <a:bodyPr lIns="0" tIns="0" rIns="0" bIns="0"/>
+          <a:lstStyle/>
           <a:p>
             <a:pPr algn="ctr">
               <a:lnSpc>
@@ -2054,7 +2620,7 @@
               </a:lnSpc>
             </a:pPr>
             <a:r>
-              <a:rPr b="1" lang="en-US" sz="8800">
+              <a:rPr lang="en-US" sz="8800" b="1">
                 <a:solidFill>
                   <a:srgbClr val="000000"/>
                 </a:solidFill>
@@ -2081,14 +2647,15 @@
             <a:avLst/>
           </a:prstGeom>
           <a:solidFill>
-            <a:srgbClr val="f2dcdb"/>
+            <a:srgbClr val="F2DCDB"/>
           </a:solidFill>
           <a:ln w="9360">
             <a:noFill/>
           </a:ln>
         </p:spPr>
         <p:txBody>
-          <a:bodyPr lIns="90000" rIns="90000" tIns="45000" bIns="45000" anchor="ctr"/>
+          <a:bodyPr lIns="90000" tIns="45000" rIns="90000" bIns="45000" anchor="ctr"/>
+          <a:lstStyle/>
           <a:p>
             <a:pPr algn="ctr">
               <a:lnSpc>
@@ -2098,7 +2665,7 @@
             <a:r>
               <a:rPr lang="en-US" sz="8600">
                 <a:solidFill>
-                  <a:srgbClr val="ffffff"/>
+                  <a:srgbClr val="FFFFFF"/>
                 </a:solidFill>
                 <a:latin typeface="Trebuchet MS"/>
               </a:rPr>
@@ -2123,7 +2690,7 @@
             <a:avLst/>
           </a:prstGeom>
           <a:solidFill>
-            <a:srgbClr val="f2dcdb"/>
+            <a:srgbClr val="F2DCDB"/>
           </a:solidFill>
           <a:ln w="9360">
             <a:noFill/>
@@ -2145,7 +2712,7 @@
             <a:avLst/>
           </a:prstGeom>
           <a:solidFill>
-            <a:srgbClr val="f2dcdb"/>
+            <a:srgbClr val="F2DCDB"/>
           </a:solidFill>
           <a:ln w="9360">
             <a:noFill/>
@@ -2172,7 +2739,8 @@
           </a:ln>
         </p:spPr>
         <p:txBody>
-          <a:bodyPr lIns="90000" rIns="90000" tIns="45000" bIns="45000"/>
+          <a:bodyPr lIns="90000" tIns="45000" rIns="90000" bIns="45000"/>
+          <a:lstStyle/>
           <a:p>
             <a:pPr>
               <a:lnSpc>
@@ -2182,7 +2750,7 @@
             <a:r>
               <a:rPr lang="en-US" sz="7200">
                 <a:solidFill>
-                  <a:srgbClr val="4a6a7e"/>
+                  <a:srgbClr val="4A6A7E"/>
                 </a:solidFill>
                 <a:latin typeface="Trebuchet MS"/>
               </a:rPr>
@@ -2262,14 +2830,15 @@
             <a:avLst/>
           </a:prstGeom>
           <a:solidFill>
-            <a:srgbClr val="f2dcdb"/>
+            <a:srgbClr val="F2DCDB"/>
           </a:solidFill>
           <a:ln w="9360">
             <a:noFill/>
           </a:ln>
         </p:spPr>
         <p:txBody>
-          <a:bodyPr lIns="90000" rIns="90000" tIns="45000" bIns="45000" anchor="ctr"/>
+          <a:bodyPr lIns="90000" tIns="45000" rIns="90000" bIns="45000" anchor="ctr"/>
+          <a:lstStyle/>
           <a:p>
             <a:pPr algn="ctr">
               <a:lnSpc>
@@ -2279,7 +2848,7 @@
             <a:r>
               <a:rPr lang="en-US" sz="8600">
                 <a:solidFill>
-                  <a:srgbClr val="ffffff"/>
+                  <a:srgbClr val="FFFFFF"/>
                 </a:solidFill>
                 <a:latin typeface="Trebuchet MS"/>
               </a:rPr>
@@ -2309,7 +2878,8 @@
           </a:ln>
         </p:spPr>
         <p:txBody>
-          <a:bodyPr lIns="0" rIns="0" tIns="0" bIns="0"/>
+          <a:bodyPr lIns="0" tIns="0" rIns="0" bIns="0"/>
+          <a:lstStyle/>
           <a:p>
             <a:pPr>
               <a:lnSpc>
@@ -2349,7 +2919,8 @@
           </a:ln>
         </p:spPr>
         <p:txBody>
-          <a:bodyPr lIns="90000" rIns="90000" tIns="45000" bIns="45000"/>
+          <a:bodyPr lIns="90000" tIns="45000" rIns="90000" bIns="45000"/>
+          <a:lstStyle/>
           <a:p>
             <a:pPr>
               <a:lnSpc>
@@ -2359,7 +2930,7 @@
             <a:r>
               <a:rPr lang="en-US" sz="7200">
                 <a:solidFill>
-                  <a:srgbClr val="4a6a7e"/>
+                  <a:srgbClr val="4A6A7E"/>
                 </a:solidFill>
                 <a:latin typeface="Trebuchet MS"/>
               </a:rPr>
@@ -2446,15 +3017,16 @@
           </a:ln>
         </p:spPr>
         <p:txBody>
-          <a:bodyPr lIns="90000" rIns="90000" tIns="45000" bIns="45000"/>
-          <a:p>
-            <a:pPr>
-              <a:lnSpc>
-                <a:spcPct val="100000"/>
-              </a:lnSpc>
-            </a:pPr>
-            <a:r>
-              <a:rPr i="1" lang="en-US" sz="2800">
+          <a:bodyPr lIns="90000" tIns="45000" rIns="90000" bIns="45000"/>
+          <a:lstStyle/>
+          <a:p>
+            <a:pPr>
+              <a:lnSpc>
+                <a:spcPct val="100000"/>
+              </a:lnSpc>
+            </a:pPr>
+            <a:r>
+              <a:rPr lang="en-US" sz="2800" i="1">
                 <a:solidFill>
                   <a:srgbClr val="000000"/>
                 </a:solidFill>
@@ -2486,32 +3058,33 @@
           </a:ln>
         </p:spPr>
         <p:txBody>
-          <a:bodyPr lIns="90000" rIns="90000" tIns="45000" bIns="45000"/>
-          <a:p>
-            <a:pPr>
-              <a:lnSpc>
-                <a:spcPct val="100000"/>
-              </a:lnSpc>
-            </a:pPr>
-            <a:r>
-              <a:rPr lang="en-US" sz="7200">
-                <a:solidFill>
-                  <a:srgbClr val="4a6a7e"/>
+          <a:bodyPr lIns="90000" tIns="45000" rIns="90000" bIns="45000"/>
+          <a:lstStyle/>
+          <a:p>
+            <a:pPr>
+              <a:lnSpc>
+                <a:spcPct val="100000"/>
+              </a:lnSpc>
+            </a:pPr>
+            <a:r>
+              <a:rPr lang="en-US" sz="7200" dirty="0">
+                <a:solidFill>
+                  <a:srgbClr val="4A6A7E"/>
                 </a:solidFill>
                 <a:latin typeface="Trebuchet MS"/>
               </a:rPr>
               <a:t>Project Description</a:t>
             </a:r>
-            <a:endParaRPr/>
-          </a:p>
-          <a:p>
-            <a:pPr>
-              <a:lnSpc>
-                <a:spcPct val="100000"/>
-              </a:lnSpc>
-            </a:pPr>
-            <a:r>
-              <a:rPr lang="en-US" sz="4000">
+            <a:endParaRPr dirty="0"/>
+          </a:p>
+          <a:p>
+            <a:pPr>
+              <a:lnSpc>
+                <a:spcPct val="100000"/>
+              </a:lnSpc>
+            </a:pPr>
+            <a:r>
+              <a:rPr lang="en-US" sz="4000" dirty="0">
                 <a:solidFill>
                   <a:srgbClr val="000000"/>
                 </a:solidFill>
@@ -2519,24 +3092,24 @@
               </a:rPr>
               <a:t>The options on the market today for home outdoor lighting control are less than ideal.  You can either pay out the nose for an overly complex fancy system, or be stuck with a cheap system that needs constant reprogramming for the changing sunset/sunrise times.</a:t>
             </a:r>
-            <a:endParaRPr/>
-          </a:p>
-          <a:p>
-            <a:pPr>
-              <a:lnSpc>
-                <a:spcPct val="100000"/>
-              </a:lnSpc>
-            </a:pPr>
-            <a:endParaRPr/>
-          </a:p>
-          <a:p>
-            <a:pPr>
-              <a:lnSpc>
-                <a:spcPct val="100000"/>
-              </a:lnSpc>
-            </a:pPr>
-            <a:r>
-              <a:rPr lang="en-US" sz="4000">
+            <a:endParaRPr dirty="0"/>
+          </a:p>
+          <a:p>
+            <a:pPr>
+              <a:lnSpc>
+                <a:spcPct val="100000"/>
+              </a:lnSpc>
+            </a:pPr>
+            <a:endParaRPr dirty="0"/>
+          </a:p>
+          <a:p>
+            <a:pPr>
+              <a:lnSpc>
+                <a:spcPct val="100000"/>
+              </a:lnSpc>
+            </a:pPr>
+            <a:r>
+              <a:rPr lang="en-US" sz="4000" dirty="0">
                 <a:solidFill>
                   <a:srgbClr val="000000"/>
                 </a:solidFill>
@@ -2544,7 +3117,7 @@
               </a:rPr>
               <a:t>Our goal is to split the difference by providing a solution that is both easy to use and affordable.  The solution includes:</a:t>
             </a:r>
-            <a:endParaRPr/>
+            <a:endParaRPr dirty="0"/>
           </a:p>
           <a:p>
             <a:pPr>
@@ -2556,7 +3129,7 @@
               <a:buChar char=""/>
             </a:pPr>
             <a:r>
-              <a:rPr lang="en-US" sz="4000">
+              <a:rPr lang="en-US" sz="4000" dirty="0">
                 <a:solidFill>
                   <a:srgbClr val="000000"/>
                 </a:solidFill>
@@ -2564,7 +3137,7 @@
               </a:rPr>
               <a:t>A central control unit with touchscreen for controlling lights</a:t>
             </a:r>
-            <a:endParaRPr/>
+            <a:endParaRPr dirty="0"/>
           </a:p>
           <a:p>
             <a:pPr>
@@ -2576,7 +3149,7 @@
               <a:buChar char=""/>
             </a:pPr>
             <a:r>
-              <a:rPr lang="en-US" sz="4000">
+              <a:rPr lang="en-US" sz="4000" dirty="0">
                 <a:solidFill>
                   <a:srgbClr val="000000"/>
                 </a:solidFill>
@@ -2584,7 +3157,7 @@
               </a:rPr>
               <a:t>Web site for controlling the entire system from a phone, laptop, tablet, or other device</a:t>
             </a:r>
-            <a:endParaRPr/>
+            <a:endParaRPr dirty="0"/>
           </a:p>
           <a:p>
             <a:pPr>
@@ -2596,7 +3169,7 @@
               <a:buChar char=""/>
             </a:pPr>
             <a:r>
-              <a:rPr lang="en-US" sz="4000">
+              <a:rPr lang="en-US" sz="4000" dirty="0">
                 <a:solidFill>
                   <a:srgbClr val="000000"/>
                 </a:solidFill>
@@ -2604,16 +3177,16 @@
               </a:rPr>
               <a:t>Power strip boxes to plug lights into that communicate with the central control unit wirelessly</a:t>
             </a:r>
-            <a:endParaRPr/>
-          </a:p>
-          <a:p>
-            <a:pPr>
-              <a:lnSpc>
-                <a:spcPct val="100000"/>
-              </a:lnSpc>
-            </a:pPr>
-            <a:r>
-              <a:rPr lang="en-US" sz="4000">
+            <a:endParaRPr dirty="0"/>
+          </a:p>
+          <a:p>
+            <a:pPr>
+              <a:lnSpc>
+                <a:spcPct val="100000"/>
+              </a:lnSpc>
+            </a:pPr>
+            <a:r>
+              <a:rPr lang="en-US" sz="4000" dirty="0">
                 <a:solidFill>
                   <a:srgbClr val="000000"/>
                 </a:solidFill>
@@ -2621,7 +3194,7 @@
               </a:rPr>
               <a:t>Running on commodity hardware and open source software, the system will be easy to extend to other applications as well, such as garage door openers, sprinkler systems, and more!</a:t>
             </a:r>
-            <a:endParaRPr/>
+            <a:endParaRPr dirty="0"/>
           </a:p>
         </p:txBody>
       </p:sp>
@@ -2645,7 +3218,8 @@
           </a:ln>
         </p:spPr>
         <p:txBody>
-          <a:bodyPr lIns="90000" rIns="90000" tIns="45000" bIns="45000"/>
+          <a:bodyPr lIns="90000" tIns="45000" rIns="90000" bIns="45000"/>
+          <a:lstStyle/>
           <a:p>
             <a:pPr>
               <a:lnSpc>
@@ -2655,7 +3229,7 @@
             <a:r>
               <a:rPr lang="en-US" sz="7200">
                 <a:solidFill>
-                  <a:srgbClr val="4a6a7e"/>
+                  <a:srgbClr val="4A6A7E"/>
                 </a:solidFill>
                 <a:latin typeface="Trebuchet MS"/>
               </a:rPr>
@@ -2818,15 +3392,16 @@
           </a:ln>
         </p:spPr>
         <p:txBody>
-          <a:bodyPr lIns="90000" rIns="90000" tIns="45000" bIns="45000"/>
-          <a:p>
-            <a:pPr>
-              <a:lnSpc>
-                <a:spcPct val="100000"/>
-              </a:lnSpc>
-            </a:pPr>
-            <a:r>
-              <a:rPr i="1" lang="en-US" sz="2800">
+          <a:bodyPr lIns="90000" tIns="45000" rIns="90000" bIns="45000"/>
+          <a:lstStyle/>
+          <a:p>
+            <a:pPr>
+              <a:lnSpc>
+                <a:spcPct val="100000"/>
+              </a:lnSpc>
+            </a:pPr>
+            <a:r>
+              <a:rPr lang="en-US" sz="2800" i="1">
                 <a:solidFill>
                   <a:srgbClr val="000000"/>
                 </a:solidFill>
@@ -2858,7 +3433,8 @@
           </a:ln>
         </p:spPr>
         <p:txBody>
-          <a:bodyPr lIns="90000" rIns="90000" tIns="45000" bIns="45000"/>
+          <a:bodyPr lIns="90000" tIns="45000" rIns="90000" bIns="45000"/>
+          <a:lstStyle/>
           <a:p>
             <a:pPr>
               <a:lnSpc>
@@ -3033,23 +3609,24 @@
           </a:ln>
         </p:spPr>
         <p:txBody>
-          <a:bodyPr lIns="90000" rIns="90000" tIns="45000" bIns="45000"/>
-          <a:p>
-            <a:pPr>
-              <a:lnSpc>
-                <a:spcPct val="100000"/>
-              </a:lnSpc>
-            </a:pPr>
-            <a:r>
-              <a:rPr lang="en-US" sz="7200">
-                <a:solidFill>
-                  <a:srgbClr val="4a6a7e"/>
+          <a:bodyPr lIns="90000" tIns="45000" rIns="90000" bIns="45000"/>
+          <a:lstStyle/>
+          <a:p>
+            <a:pPr>
+              <a:lnSpc>
+                <a:spcPct val="100000"/>
+              </a:lnSpc>
+            </a:pPr>
+            <a:r>
+              <a:rPr lang="en-US" sz="7200" dirty="0">
+                <a:solidFill>
+                  <a:srgbClr val="4A6A7E"/>
                 </a:solidFill>
                 <a:latin typeface="Trebuchet MS"/>
               </a:rPr>
               <a:t>Results and Recommendations</a:t>
             </a:r>
-            <a:endParaRPr/>
+            <a:endParaRPr dirty="0"/>
           </a:p>
           <a:p>
             <a:pPr>
@@ -3060,26 +3637,100 @@
               <a:buChar char="•"/>
             </a:pPr>
             <a:r>
-              <a:rPr lang="en-US" sz="4000">
+              <a:rPr lang="en-US" sz="4000" dirty="0">
                 <a:solidFill>
                   <a:srgbClr val="000000"/>
                 </a:solidFill>
                 <a:latin typeface="Trebuchet MS"/>
               </a:rPr>
-              <a:t>&lt;include plan for how to test if it was successful&gt;</a:t>
-            </a:r>
-            <a:endParaRPr/>
+              <a:t>&lt;include plan for how to test if it was successful</a:t>
+            </a:r>
+            <a:r>
+              <a:rPr lang="en-US" sz="4000" dirty="0" smtClean="0">
+                <a:solidFill>
+                  <a:srgbClr val="000000"/>
+                </a:solidFill>
+                <a:latin typeface="Trebuchet MS"/>
+              </a:rPr>
+              <a:t>&gt;</a:t>
+            </a:r>
+          </a:p>
+          <a:p>
+            <a:pPr>
+              <a:lnSpc>
+                <a:spcPct val="100000"/>
+              </a:lnSpc>
+            </a:pPr>
+            <a:r>
+              <a:rPr lang="en-US" sz="4000" dirty="0" smtClean="0">
+                <a:solidFill>
+                  <a:srgbClr val="000000"/>
+                </a:solidFill>
+                <a:latin typeface="Trebuchet MS"/>
+              </a:rPr>
+              <a:t>To test our solution, we could explore all of the different situations that it could be put in, and make sure that it reacts </a:t>
+            </a:r>
+            <a:r>
+              <a:rPr lang="en-US" sz="4000" smtClean="0">
+                <a:solidFill>
+                  <a:srgbClr val="000000"/>
+                </a:solidFill>
+                <a:latin typeface="Trebuchet MS"/>
+              </a:rPr>
+              <a:t>as expected.</a:t>
+            </a:r>
+            <a:endParaRPr lang="en-US" sz="4000" dirty="0" smtClean="0">
+              <a:solidFill>
+                <a:srgbClr val="000000"/>
+              </a:solidFill>
+              <a:latin typeface="Trebuchet MS"/>
+            </a:endParaRPr>
+          </a:p>
+          <a:p>
+            <a:pPr>
+              <a:lnSpc>
+                <a:spcPct val="100000"/>
+              </a:lnSpc>
+            </a:pPr>
+            <a:endParaRPr lang="en-US" sz="4000" dirty="0">
+              <a:solidFill>
+                <a:srgbClr val="000000"/>
+              </a:solidFill>
+              <a:latin typeface="Trebuchet MS"/>
+            </a:endParaRPr>
+          </a:p>
+          <a:p>
+            <a:pPr>
+              <a:lnSpc>
+                <a:spcPct val="100000"/>
+              </a:lnSpc>
+            </a:pPr>
+            <a:r>
+              <a:rPr lang="en-US" sz="4000" dirty="0" smtClean="0">
+                <a:solidFill>
+                  <a:srgbClr val="000000"/>
+                </a:solidFill>
+                <a:latin typeface="Trebuchet MS"/>
+              </a:rPr>
+              <a:t>Some of this testing could be done using unit tests, but much of it would have to be manual in order to verify that it interacts with the lights correctly.</a:t>
+            </a:r>
+            <a:endParaRPr lang="en-US" sz="4000" dirty="0" smtClean="0">
+              <a:solidFill>
+                <a:srgbClr val="000000"/>
+              </a:solidFill>
+              <a:latin typeface="Trebuchet MS"/>
+            </a:endParaRPr>
           </a:p>
         </p:txBody>
       </p:sp>
       <p:pic>
         <p:nvPicPr>
-          <p:cNvPr id="70" name="" descr=""/>
+          <p:cNvPr id="70" name="Picture 69"/>
           <p:cNvPicPr/>
           <p:nvPr/>
         </p:nvPicPr>
         <p:blipFill>
-          <a:blip r:embed="rId1"/>
+          <a:blip r:embed="rId3"/>
           <a:stretch>
             <a:fillRect/>
           </a:stretch>
@@ -3099,6 +3750,9 @@
       </p:pic>
     </p:spTree>
   </p:cSld>
+  <p:clrMapOvr>
+    <a:masterClrMapping/>
+  </p:clrMapOvr>
   <p:timing>
     <p:tnLst>
       <p:par>
@@ -3107,14 +3761,14 @@
             <p:seq>
               <p:cTn id="2" nodeType="mainSeq"/>
               <p:prevCondLst>
-                <p:cond delay="0" evt="onPrev">
+                <p:cond evt="onPrev" delay="0">
                   <p:tgtEl>
                     <p:sldTgt/>
                   </p:tgtEl>
                 </p:cond>
               </p:prevCondLst>
               <p:nextCondLst>
-                <p:cond delay="0" evt="onNext">
+                <p:cond evt="onNext" delay="0">
                   <p:tgtEl>
                     <p:sldTgt/>
                   </p:tgtEl>
@@ -3349,6 +4003,8 @@
       </a:bgFillStyleLst>
     </a:fmtScheme>
   </a:themeElements>
+  <a:objectDefaults/>
+  <a:extraClrSchemeLst/>
 </a:theme>
 </file>
 
@@ -3572,5 +4228,7 @@
       </a:bgFillStyleLst>
     </a:fmtScheme>
   </a:themeElements>
+  <a:objectDefaults/>
+  <a:extraClrSchemeLst/>
 </a:theme>
 </file>
</xml_diff>